<commit_message>
forgot to save presentation
</commit_message>
<xml_diff>
--- a/Presentation.pptx
+++ b/Presentation.pptx
@@ -9,7 +9,6 @@
     <p:sldId id="257" r:id="rId3"/>
     <p:sldId id="258" r:id="rId4"/>
     <p:sldId id="259" r:id="rId5"/>
-    <p:sldId id="260" r:id="rId6"/>
   </p:sldIdLst>
   <p:sldSz cx="9144000" cy="6858000" type="screen4x3"/>
   <p:notesSz cx="6858000" cy="9144000"/>
@@ -5440,7 +5439,7 @@
           <a:p>
             <a:r>
               <a:rPr lang="en-US" dirty="0" smtClean="0"/>
-              <a:t>Software Piracy</a:t>
+              <a:t>UDP++</a:t>
             </a:r>
             <a:endParaRPr lang="en-US" dirty="0"/>
           </a:p>
@@ -5468,42 +5467,42 @@
           <a:p>
             <a:r>
               <a:rPr lang="en-US" dirty="0" smtClean="0"/>
-              <a:t>Scholarly article vs. Popular article</a:t>
-            </a:r>
-          </a:p>
-          <a:p>
-            <a:r>
-              <a:rPr lang="en-US" dirty="0" smtClean="0"/>
-              <a:t>By Adam Darrah</a:t>
+              <a:t>UDP++ Transport Layer Protocol</a:t>
+            </a:r>
+          </a:p>
+          <a:p>
+            <a:r>
+              <a:rPr lang="en-US" dirty="0" smtClean="0"/>
+              <a:t>By Adam </a:t>
+            </a:r>
+            <a:r>
+              <a:rPr lang="en-US" dirty="0" err="1" smtClean="0"/>
+              <a:t>Darrah</a:t>
+            </a:r>
+            <a:r>
+              <a:rPr lang="en-US" dirty="0" smtClean="0"/>
+              <a:t> and</a:t>
+            </a:r>
+            <a:r>
+              <a:rPr lang="en-US" dirty="0" smtClean="0"/>
+              <a:t> </a:t>
+            </a:r>
+            <a:r>
+              <a:rPr lang="en-US" dirty="0" err="1" smtClean="0"/>
+              <a:t>Asad</a:t>
+            </a:r>
+            <a:r>
+              <a:rPr lang="en-US" dirty="0" smtClean="0"/>
+              <a:t> </a:t>
+            </a:r>
+            <a:r>
+              <a:rPr lang="en-US" dirty="0" err="1" smtClean="0"/>
+              <a:t>Saeed</a:t>
             </a:r>
             <a:endParaRPr lang="en-US" dirty="0"/>
           </a:p>
         </p:txBody>
       </p:sp>
-      <p:pic>
-        <p:nvPicPr>
-          <p:cNvPr id="5" name="Picture 4" descr="529px-The_Pirate_Bay_logo.svg.png"/>
-          <p:cNvPicPr>
-            <a:picLocks noChangeAspect="1"/>
-          </p:cNvPicPr>
-          <p:nvPr/>
-        </p:nvPicPr>
-        <p:blipFill>
-          <a:blip r:embed="rId2"/>
-          <a:stretch>
-            <a:fillRect/>
-          </a:stretch>
-        </p:blipFill>
-        <p:spPr>
-          <a:xfrm>
-            <a:off x="4572000" y="0"/>
-            <a:ext cx="3499348" cy="3962400"/>
-          </a:xfrm>
-          <a:prstGeom prst="rect">
-            <a:avLst/>
-          </a:prstGeom>
-        </p:spPr>
-      </p:pic>
     </p:spTree>
   </p:cSld>
   <p:clrMapOvr>
@@ -5553,7 +5552,7 @@
           <a:p>
             <a:r>
               <a:rPr lang="en-US" dirty="0" smtClean="0"/>
-              <a:t>Differences</a:t>
+              <a:t>Features</a:t>
             </a:r>
             <a:endParaRPr lang="en-US" dirty="0"/>
           </a:p>
@@ -5576,83 +5575,34 @@
           <a:p>
             <a:r>
               <a:rPr lang="en-US" dirty="0" smtClean="0"/>
-              <a:t>Scholarly</a:t>
-            </a:r>
-          </a:p>
-          <a:p>
-            <a:pPr lvl="1"/>
-            <a:r>
-              <a:rPr lang="en-US" dirty="0" smtClean="0"/>
-              <a:t>3 authors</a:t>
-            </a:r>
-          </a:p>
-          <a:p>
-            <a:pPr lvl="1"/>
-            <a:r>
-              <a:rPr lang="en-US" dirty="0" smtClean="0"/>
-              <a:t>Audience is more educated</a:t>
-            </a:r>
-          </a:p>
-          <a:p>
-            <a:pPr lvl="1"/>
-            <a:r>
-              <a:rPr lang="en-US" dirty="0" smtClean="0"/>
-              <a:t>Contained interview</a:t>
-            </a:r>
-          </a:p>
-          <a:p>
-            <a:pPr lvl="1"/>
-            <a:r>
-              <a:rPr lang="en-US" dirty="0" smtClean="0"/>
-              <a:t>Contained data tables</a:t>
-            </a:r>
-          </a:p>
-          <a:p>
-            <a:r>
-              <a:rPr lang="en-US" dirty="0" smtClean="0"/>
-              <a:t>Popular:</a:t>
-            </a:r>
-          </a:p>
-          <a:p>
-            <a:pPr lvl="1"/>
-            <a:r>
-              <a:rPr lang="en-US" dirty="0" smtClean="0"/>
-              <a:t>No clear author</a:t>
-            </a:r>
-          </a:p>
-          <a:p>
-            <a:pPr lvl="1"/>
-            <a:r>
-              <a:rPr lang="en-US" dirty="0" smtClean="0"/>
-              <a:t>Audience is less educated</a:t>
-            </a:r>
-          </a:p>
-        </p:txBody>
-      </p:sp>
-      <p:pic>
-        <p:nvPicPr>
-          <p:cNvPr id="4" name="Picture 3" descr="differences.jpg"/>
-          <p:cNvPicPr>
-            <a:picLocks noChangeAspect="1"/>
-          </p:cNvPicPr>
-          <p:nvPr/>
-        </p:nvPicPr>
-        <p:blipFill>
-          <a:blip r:embed="rId2"/>
-          <a:stretch>
-            <a:fillRect/>
-          </a:stretch>
-        </p:blipFill>
-        <p:spPr>
-          <a:xfrm>
-            <a:off x="4988750" y="1828800"/>
-            <a:ext cx="3374200" cy="2618232"/>
-          </a:xfrm>
-          <a:prstGeom prst="rect">
-            <a:avLst/>
-          </a:prstGeom>
-        </p:spPr>
-      </p:pic>
+              <a:t>In order packets</a:t>
+            </a:r>
+          </a:p>
+          <a:p>
+            <a:r>
+              <a:rPr lang="en-US" dirty="0" smtClean="0"/>
+              <a:t>Send/Receive buffering</a:t>
+            </a:r>
+          </a:p>
+          <a:p>
+            <a:r>
+              <a:rPr lang="en-US" dirty="0" smtClean="0"/>
+              <a:t>Selective ACK</a:t>
+            </a:r>
+          </a:p>
+          <a:p>
+            <a:r>
+              <a:rPr lang="en-US" dirty="0" smtClean="0"/>
+              <a:t>Many simultaneous connections (using </a:t>
+            </a:r>
+            <a:r>
+              <a:rPr lang="en-US" dirty="0" smtClean="0"/>
+              <a:t>threads)</a:t>
+            </a:r>
+            <a:endParaRPr lang="en-US" dirty="0" smtClean="0"/>
+          </a:p>
+        </p:txBody>
+      </p:sp>
     </p:spTree>
   </p:cSld>
   <p:clrMapOvr>
@@ -5695,14 +5645,19 @@
             <p:ph type="title"/>
           </p:nvPr>
         </p:nvSpPr>
-        <p:spPr/>
+        <p:spPr>
+          <a:xfrm>
+            <a:off x="533400" y="381000"/>
+            <a:ext cx="7583487" cy="1044388"/>
+          </a:xfrm>
+        </p:spPr>
         <p:txBody>
           <a:bodyPr/>
           <a:lstStyle/>
           <a:p>
             <a:r>
               <a:rPr lang="en-US" dirty="0" smtClean="0"/>
-              <a:t>Similarities</a:t>
+              <a:t>Example client program</a:t>
             </a:r>
             <a:endParaRPr lang="en-US" dirty="0"/>
           </a:p>
@@ -5710,74 +5665,343 @@
       </p:sp>
       <p:sp>
         <p:nvSpPr>
-          <p:cNvPr id="3" name="Content Placeholder 2"/>
-          <p:cNvSpPr>
-            <a:spLocks noGrp="1"/>
-          </p:cNvSpPr>
-          <p:nvPr>
-            <p:ph idx="1"/>
-          </p:nvPr>
+          <p:cNvPr id="6" name="TextBox 5"/>
+          <p:cNvSpPr txBox="1"/>
+          <p:nvPr/>
         </p:nvSpPr>
         <p:spPr>
           <a:xfrm>
-            <a:off x="779463" y="1828800"/>
-            <a:ext cx="3411537" cy="4208930"/>
-          </a:xfrm>
-        </p:spPr>
-        <p:txBody>
-          <a:bodyPr/>
-          <a:lstStyle/>
-          <a:p>
-            <a:r>
-              <a:rPr lang="en-US" dirty="0" smtClean="0"/>
-              <a:t>Plain formatting</a:t>
-            </a:r>
-          </a:p>
-          <a:p>
-            <a:r>
-              <a:rPr lang="en-US" dirty="0" smtClean="0"/>
-              <a:t>Both use statistics</a:t>
-            </a:r>
-          </a:p>
-          <a:p>
-            <a:r>
-              <a:rPr lang="en-US" dirty="0" smtClean="0"/>
-              <a:t>Both included history of piracy</a:t>
-            </a:r>
-          </a:p>
-          <a:p>
-            <a:r>
-              <a:rPr lang="en-US" dirty="0" smtClean="0"/>
-              <a:t>No advertisements</a:t>
-            </a:r>
-            <a:endParaRPr lang="en-US" dirty="0"/>
-          </a:p>
-        </p:txBody>
-      </p:sp>
-      <p:pic>
-        <p:nvPicPr>
-          <p:cNvPr id="4" name="Picture 3" descr="sharingiscaring.jpg"/>
-          <p:cNvPicPr>
-            <a:picLocks noChangeAspect="1"/>
-          </p:cNvPicPr>
-          <p:nvPr/>
-        </p:nvPicPr>
-        <p:blipFill>
-          <a:blip r:embed="rId2"/>
-          <a:stretch>
-            <a:fillRect/>
-          </a:stretch>
-        </p:blipFill>
-        <p:spPr>
-          <a:xfrm>
-            <a:off x="4191000" y="1828800"/>
-            <a:ext cx="4495800" cy="2585085"/>
+            <a:off x="762000" y="1812162"/>
+            <a:ext cx="8382000" cy="4524316"/>
           </a:xfrm>
           <a:prstGeom prst="rect">
             <a:avLst/>
           </a:prstGeom>
-        </p:spPr>
-      </p:pic>
+          <a:noFill/>
+        </p:spPr>
+        <p:txBody>
+          <a:bodyPr wrap="square" rtlCol="0">
+            <a:spAutoFit/>
+          </a:bodyPr>
+          <a:lstStyle/>
+          <a:p>
+            <a:r>
+              <a:rPr lang="en-US" dirty="0" err="1" smtClean="0"/>
+              <a:t>int</a:t>
+            </a:r>
+            <a:r>
+              <a:rPr lang="en-US" dirty="0" smtClean="0"/>
+              <a:t> </a:t>
+            </a:r>
+            <a:r>
+              <a:rPr lang="en-US" dirty="0" err="1" smtClean="0"/>
+              <a:t>main(int</a:t>
+            </a:r>
+            <a:r>
+              <a:rPr lang="en-US" dirty="0" smtClean="0"/>
+              <a:t> </a:t>
+            </a:r>
+            <a:r>
+              <a:rPr lang="en-US" dirty="0" err="1" smtClean="0"/>
+              <a:t>argc</a:t>
+            </a:r>
+            <a:r>
+              <a:rPr lang="en-US" dirty="0" smtClean="0"/>
+              <a:t>, char* </a:t>
+            </a:r>
+            <a:r>
+              <a:rPr lang="en-US" dirty="0" err="1" smtClean="0"/>
+              <a:t>argv</a:t>
+            </a:r>
+            <a:r>
+              <a:rPr lang="en-US" dirty="0" smtClean="0"/>
+              <a:t>[]) {   </a:t>
+            </a:r>
+            <a:r>
+              <a:rPr lang="en-US" dirty="0" smtClean="0"/>
+              <a:t> </a:t>
+            </a:r>
+          </a:p>
+          <a:p>
+            <a:r>
+              <a:rPr lang="en-US" dirty="0" smtClean="0"/>
+              <a:t>	</a:t>
+            </a:r>
+            <a:r>
+              <a:rPr lang="en-US" dirty="0" err="1" smtClean="0"/>
+              <a:t>UDPPlus</a:t>
+            </a:r>
+            <a:r>
+              <a:rPr lang="en-US" dirty="0" smtClean="0"/>
+              <a:t> </a:t>
+            </a:r>
+            <a:r>
+              <a:rPr lang="en-US" dirty="0" smtClean="0"/>
+              <a:t>*</a:t>
+            </a:r>
+            <a:r>
+              <a:rPr lang="en-US" dirty="0" err="1" smtClean="0"/>
+              <a:t>conn</a:t>
+            </a:r>
+            <a:r>
+              <a:rPr lang="en-US" dirty="0" smtClean="0"/>
+              <a:t> = new </a:t>
+            </a:r>
+            <a:r>
+              <a:rPr lang="en-US" dirty="0" err="1" smtClean="0"/>
+              <a:t>UDPPlus</a:t>
+            </a:r>
+            <a:r>
+              <a:rPr lang="en-US" dirty="0" smtClean="0"/>
+              <a:t>;</a:t>
+            </a:r>
+          </a:p>
+          <a:p>
+            <a:r>
+              <a:rPr lang="en-US" dirty="0" smtClean="0"/>
+              <a:t>	</a:t>
+            </a:r>
+            <a:r>
+              <a:rPr lang="en-US" dirty="0" err="1" smtClean="0"/>
+              <a:t>UDPPlusConnection</a:t>
+            </a:r>
+            <a:r>
+              <a:rPr lang="en-US" dirty="0" smtClean="0"/>
+              <a:t> </a:t>
+            </a:r>
+            <a:r>
+              <a:rPr lang="en-US" dirty="0" smtClean="0"/>
+              <a:t>*open</a:t>
+            </a:r>
+            <a:r>
+              <a:rPr lang="en-US" dirty="0" smtClean="0"/>
+              <a:t>;</a:t>
+            </a:r>
+          </a:p>
+          <a:p>
+            <a:r>
+              <a:rPr lang="en-US" dirty="0" smtClean="0"/>
+              <a:t>	const </a:t>
+            </a:r>
+            <a:r>
+              <a:rPr lang="en-US" dirty="0" err="1" smtClean="0"/>
+              <a:t>int</a:t>
+            </a:r>
+            <a:r>
+              <a:rPr lang="en-US" dirty="0" smtClean="0"/>
+              <a:t> PORT = 30000</a:t>
+            </a:r>
+            <a:r>
+              <a:rPr lang="en-US" dirty="0" smtClean="0"/>
+              <a:t>;</a:t>
+            </a:r>
+          </a:p>
+          <a:p>
+            <a:endParaRPr lang="en-US" dirty="0" smtClean="0"/>
+          </a:p>
+          <a:p>
+            <a:r>
+              <a:rPr lang="en-US" dirty="0" smtClean="0"/>
+              <a:t>	/</a:t>
+            </a:r>
+            <a:r>
+              <a:rPr lang="en-US" dirty="0" smtClean="0"/>
+              <a:t>/ setup </a:t>
+            </a:r>
+            <a:r>
+              <a:rPr lang="en-US" dirty="0" err="1" smtClean="0"/>
+              <a:t>sockaddr_in</a:t>
+            </a:r>
+            <a:r>
+              <a:rPr lang="en-US" dirty="0" smtClean="0"/>
+              <a:t> </a:t>
+            </a:r>
+            <a:r>
+              <a:rPr lang="en-US" dirty="0" err="1" smtClean="0"/>
+              <a:t>struct</a:t>
+            </a:r>
+            <a:endParaRPr lang="en-US" dirty="0" smtClean="0"/>
+          </a:p>
+          <a:p>
+            <a:r>
+              <a:rPr lang="en-US" dirty="0" smtClean="0"/>
+              <a:t>	</a:t>
+            </a:r>
+            <a:r>
+              <a:rPr lang="en-US" dirty="0" err="1" smtClean="0"/>
+              <a:t>struct</a:t>
+            </a:r>
+            <a:r>
+              <a:rPr lang="en-US" dirty="0" smtClean="0"/>
+              <a:t> </a:t>
+            </a:r>
+            <a:r>
+              <a:rPr lang="en-US" dirty="0" err="1" smtClean="0"/>
+              <a:t>sockaddr_in</a:t>
+            </a:r>
+            <a:r>
+              <a:rPr lang="en-US" dirty="0" smtClean="0"/>
+              <a:t> host</a:t>
+            </a:r>
+            <a:r>
+              <a:rPr lang="en-US" dirty="0" smtClean="0"/>
+              <a:t>;</a:t>
+            </a:r>
+          </a:p>
+          <a:p>
+            <a:r>
+              <a:rPr lang="en-US" dirty="0" smtClean="0"/>
+              <a:t>	</a:t>
+            </a:r>
+            <a:r>
+              <a:rPr lang="en-US" dirty="0" err="1" smtClean="0"/>
+              <a:t>memset</a:t>
+            </a:r>
+            <a:r>
+              <a:rPr lang="en-US" dirty="0" err="1" smtClean="0"/>
+              <a:t>((char</a:t>
+            </a:r>
+            <a:r>
+              <a:rPr lang="en-US" dirty="0" smtClean="0"/>
+              <a:t> *) &amp;host, 0, </a:t>
+            </a:r>
+            <a:r>
+              <a:rPr lang="en-US" dirty="0" err="1" smtClean="0"/>
+              <a:t>sizeof(host</a:t>
+            </a:r>
+            <a:r>
+              <a:rPr lang="en-US" dirty="0" smtClean="0"/>
+              <a:t>))</a:t>
+            </a:r>
+            <a:r>
+              <a:rPr lang="en-US" dirty="0" smtClean="0"/>
+              <a:t>;</a:t>
+            </a:r>
+          </a:p>
+          <a:p>
+            <a:r>
+              <a:rPr lang="en-US" dirty="0" smtClean="0"/>
+              <a:t>	</a:t>
+            </a:r>
+            <a:r>
+              <a:rPr lang="en-US" dirty="0" err="1" smtClean="0"/>
+              <a:t>host.sin_family</a:t>
+            </a:r>
+            <a:r>
+              <a:rPr lang="en-US" dirty="0" smtClean="0"/>
+              <a:t> </a:t>
+            </a:r>
+            <a:r>
+              <a:rPr lang="en-US" dirty="0" smtClean="0"/>
+              <a:t>= AF_INET</a:t>
+            </a:r>
+            <a:r>
+              <a:rPr lang="en-US" dirty="0" smtClean="0"/>
+              <a:t>;</a:t>
+            </a:r>
+          </a:p>
+          <a:p>
+            <a:r>
+              <a:rPr lang="en-US" dirty="0" smtClean="0"/>
+              <a:t>	host	.</a:t>
+            </a:r>
+            <a:r>
+              <a:rPr lang="en-US" dirty="0" err="1" smtClean="0"/>
+              <a:t>sin_port</a:t>
+            </a:r>
+            <a:r>
+              <a:rPr lang="en-US" dirty="0" smtClean="0"/>
+              <a:t> </a:t>
+            </a:r>
+            <a:r>
+              <a:rPr lang="en-US" dirty="0" smtClean="0"/>
+              <a:t>= </a:t>
+            </a:r>
+            <a:r>
+              <a:rPr lang="en-US" dirty="0" err="1" smtClean="0"/>
+              <a:t>htons(PORT</a:t>
+            </a:r>
+            <a:r>
+              <a:rPr lang="en-US" dirty="0" smtClean="0"/>
+              <a:t>);</a:t>
+            </a:r>
+          </a:p>
+          <a:p>
+            <a:r>
+              <a:rPr lang="en-US" dirty="0" smtClean="0"/>
+              <a:t>	</a:t>
+            </a:r>
+          </a:p>
+          <a:p>
+            <a:r>
+              <a:rPr lang="en-US" dirty="0" smtClean="0"/>
+              <a:t>	// connect to server</a:t>
+            </a:r>
+          </a:p>
+          <a:p>
+            <a:r>
+              <a:rPr lang="en-US" dirty="0" smtClean="0"/>
+              <a:t>	open </a:t>
+            </a:r>
+            <a:r>
+              <a:rPr lang="en-US" dirty="0" smtClean="0"/>
+              <a:t>= </a:t>
+            </a:r>
+            <a:r>
+              <a:rPr lang="en-US" dirty="0" err="1" smtClean="0"/>
+              <a:t>conn</a:t>
+            </a:r>
+            <a:r>
+              <a:rPr lang="en-US" dirty="0" smtClean="0"/>
+              <a:t>-&gt;</a:t>
+            </a:r>
+            <a:r>
+              <a:rPr lang="en-US" dirty="0" err="1" smtClean="0"/>
+              <a:t>conn(&amp;host</a:t>
+            </a:r>
+            <a:r>
+              <a:rPr lang="en-US" dirty="0" smtClean="0"/>
+              <a:t>, </a:t>
+            </a:r>
+            <a:r>
+              <a:rPr lang="en-US" dirty="0" err="1" smtClean="0"/>
+              <a:t>sizeof(host</a:t>
+            </a:r>
+            <a:r>
+              <a:rPr lang="en-US" dirty="0" smtClean="0"/>
+              <a:t>)</a:t>
+            </a:r>
+            <a:r>
+              <a:rPr lang="en-US" dirty="0" smtClean="0"/>
+              <a:t>);</a:t>
+            </a:r>
+          </a:p>
+          <a:p>
+            <a:endParaRPr lang="en-US" dirty="0" smtClean="0"/>
+          </a:p>
+          <a:p>
+            <a:r>
+              <a:rPr lang="en-US" dirty="0" smtClean="0"/>
+              <a:t>	return </a:t>
+            </a:r>
+            <a:r>
+              <a:rPr lang="en-US" dirty="0" smtClean="0"/>
+              <a:t>0</a:t>
+            </a:r>
+            <a:r>
+              <a:rPr lang="en-US" dirty="0" smtClean="0"/>
+              <a:t>;</a:t>
+            </a:r>
+          </a:p>
+          <a:p>
+            <a:r>
+              <a:rPr lang="en-US" dirty="0" smtClean="0"/>
+              <a:t>}</a:t>
+            </a:r>
+            <a:endParaRPr lang="en-US" dirty="0"/>
+          </a:p>
+        </p:txBody>
+      </p:sp>
     </p:spTree>
   </p:cSld>
   <p:clrMapOvr>
@@ -5827,173 +6051,7 @@
           <a:p>
             <a:r>
               <a:rPr lang="en-US" dirty="0" smtClean="0"/>
-              <a:t>Questions</a:t>
-            </a:r>
-            <a:endParaRPr lang="en-US" dirty="0"/>
-          </a:p>
-        </p:txBody>
-      </p:sp>
-      <p:sp>
-        <p:nvSpPr>
-          <p:cNvPr id="3" name="Content Placeholder 2"/>
-          <p:cNvSpPr>
-            <a:spLocks noGrp="1"/>
-          </p:cNvSpPr>
-          <p:nvPr>
-            <p:ph idx="1"/>
-          </p:nvPr>
-        </p:nvSpPr>
-        <p:spPr>
-          <a:xfrm>
-            <a:off x="779463" y="1828800"/>
-            <a:ext cx="5773737" cy="4208930"/>
-          </a:xfrm>
-        </p:spPr>
-        <p:txBody>
-          <a:bodyPr/>
-          <a:lstStyle/>
-          <a:p>
-            <a:r>
-              <a:rPr lang="en-US" dirty="0" smtClean="0"/>
-              <a:t>Popular article was a basic summary of scholarly article</a:t>
-            </a:r>
-          </a:p>
-          <a:p>
-            <a:r>
-              <a:rPr lang="en-US" dirty="0" smtClean="0"/>
-              <a:t>Popular article was aimed at a less educated audience</a:t>
-            </a:r>
-          </a:p>
-          <a:p>
-            <a:r>
-              <a:rPr lang="en-US" dirty="0" smtClean="0"/>
-              <a:t>Popular article was mostly accurate:</a:t>
-            </a:r>
-          </a:p>
-          <a:p>
-            <a:pPr lvl="1"/>
-            <a:r>
-              <a:rPr lang="en-US" dirty="0" smtClean="0"/>
-              <a:t>Statistical inaccuracy</a:t>
-            </a:r>
-          </a:p>
-          <a:p>
-            <a:pPr lvl="1"/>
-            <a:r>
-              <a:rPr lang="en-US" dirty="0" smtClean="0"/>
-              <a:t>Popular article claimed 10% drop in piracy would create 500,000 jobs</a:t>
-            </a:r>
-            <a:endParaRPr lang="en-US" dirty="0"/>
-          </a:p>
-        </p:txBody>
-      </p:sp>
-      <p:pic>
-        <p:nvPicPr>
-          <p:cNvPr id="5" name="Picture 4" descr="confused.jpg"/>
-          <p:cNvPicPr>
-            <a:picLocks noChangeAspect="1"/>
-          </p:cNvPicPr>
-          <p:nvPr/>
-        </p:nvPicPr>
-        <p:blipFill>
-          <a:blip r:embed="rId2"/>
-          <a:stretch>
-            <a:fillRect/>
-          </a:stretch>
-        </p:blipFill>
-        <p:spPr>
-          <a:xfrm>
-            <a:off x="6778413" y="2133600"/>
-            <a:ext cx="1584537" cy="2895600"/>
-          </a:xfrm>
-          <a:prstGeom prst="rect">
-            <a:avLst/>
-          </a:prstGeom>
-        </p:spPr>
-      </p:pic>
-    </p:spTree>
-  </p:cSld>
-  <p:clrMapOvr>
-    <a:masterClrMapping/>
-  </p:clrMapOvr>
-  <p:timing>
-    <p:tnLst>
-      <p:par>
-        <p:cTn id="1" dur="indefinite" restart="never" nodeType="tmRoot"/>
-      </p:par>
-    </p:tnLst>
-  </p:timing>
-</p:sld>
-</file>
-
-<file path=ppt/slides/slide5.xml><?xml version="1.0" encoding="utf-8"?>
-<p:sld xmlns:a="http://schemas.openxmlformats.org/drawingml/2006/main" xmlns:r="http://schemas.openxmlformats.org/officeDocument/2006/relationships" xmlns:mc="http://schemas.openxmlformats.org/markup-compatibility/2006" xmlns:mv="urn:schemas-microsoft-com:mac:vml" xmlns:p="http://schemas.openxmlformats.org/presentationml/2006/main" mc:Ignorable="mv" mc:PreserveAttributes="mv:*">
-  <p:cSld>
-    <p:spTree>
-      <p:nvGrpSpPr>
-        <p:cNvPr id="1" name=""/>
-        <p:cNvGrpSpPr/>
-        <p:nvPr/>
-      </p:nvGrpSpPr>
-      <p:grpSpPr>
-        <a:xfrm>
-          <a:off x="0" y="0"/>
-          <a:ext cx="0" cy="0"/>
-          <a:chOff x="0" y="0"/>
-          <a:chExt cx="0" cy="0"/>
-        </a:xfrm>
-      </p:grpSpPr>
-      <p:sp>
-        <p:nvSpPr>
-          <p:cNvPr id="2" name="Title 1"/>
-          <p:cNvSpPr>
-            <a:spLocks noGrp="1"/>
-          </p:cNvSpPr>
-          <p:nvPr>
-            <p:ph type="title"/>
-          </p:nvPr>
-        </p:nvSpPr>
-        <p:spPr>
-          <a:xfrm>
-            <a:off x="779463" y="152400"/>
-            <a:ext cx="7583487" cy="1044388"/>
-          </a:xfrm>
-        </p:spPr>
-        <p:txBody>
-          <a:bodyPr/>
-          <a:lstStyle/>
-          <a:p>
-            <a:r>
-              <a:rPr lang="en-US" dirty="0" smtClean="0"/>
-              <a:t>Final Thoughts</a:t>
-            </a:r>
-            <a:endParaRPr lang="en-US" dirty="0"/>
-          </a:p>
-        </p:txBody>
-      </p:sp>
-      <p:sp>
-        <p:nvSpPr>
-          <p:cNvPr id="3" name="Content Placeholder 2"/>
-          <p:cNvSpPr>
-            <a:spLocks noGrp="1"/>
-          </p:cNvSpPr>
-          <p:nvPr>
-            <p:ph idx="1"/>
-          </p:nvPr>
-        </p:nvSpPr>
-        <p:spPr>
-          <a:xfrm>
-            <a:off x="779463" y="1425388"/>
-            <a:ext cx="7983537" cy="2384612"/>
-          </a:xfrm>
-        </p:spPr>
-        <p:txBody>
-          <a:bodyPr/>
-          <a:lstStyle/>
-          <a:p>
-            <a:r>
-              <a:rPr lang="en-US" dirty="0" smtClean="0"/>
-              <a:t>“By compromising intellectual property, pirates inhibit innovation and remove any financial incentive to develop a new product or work of art. The interesting thing, however, is that pirates probably see themselves as the innovators, using technology to spread information more widely and effectively than ever before.” -Mikhail Atallah</a:t>
+              <a:t>Example server program</a:t>
             </a:r>
             <a:endParaRPr lang="en-US" dirty="0"/>
           </a:p>
@@ -6007,8 +6065,8 @@
         </p:nvSpPr>
         <p:spPr>
           <a:xfrm>
-            <a:off x="779463" y="4167426"/>
-            <a:ext cx="7983537" cy="861774"/>
+            <a:off x="779463" y="1425388"/>
+            <a:ext cx="7145337" cy="5078314"/>
           </a:xfrm>
           <a:prstGeom prst="rect">
             <a:avLst/>
@@ -6022,98 +6080,364 @@
           <a:lstStyle/>
           <a:p>
             <a:r>
-              <a:rPr lang="en-US" sz="1000" dirty="0" smtClean="0"/>
-              <a:t>Popular </a:t>
-            </a:r>
-            <a:r>
-              <a:rPr lang="en-US" sz="1000" dirty="0" err="1" smtClean="0"/>
-              <a:t>article:"</a:t>
-            </a:r>
-            <a:r>
-              <a:rPr lang="en-US" sz="1000" u="sng" dirty="0" err="1" smtClean="0">
-                <a:hlinkClick r:id="rId2"/>
-              </a:rPr>
-              <a:t>Software</a:t>
-            </a:r>
-            <a:r>
-              <a:rPr lang="en-US" sz="1000" u="sng" dirty="0" smtClean="0">
-                <a:hlinkClick r:id="rId2"/>
-              </a:rPr>
+              <a:rPr lang="en-US" dirty="0" err="1" smtClean="0"/>
+              <a:t>int</a:t>
+            </a:r>
+            <a:r>
+              <a:rPr lang="en-US" dirty="0" smtClean="0"/>
               <a:t> </a:t>
             </a:r>
             <a:r>
-              <a:rPr lang="en-US" sz="1000" u="sng" dirty="0">
-                <a:hlinkClick r:id="rId2"/>
-              </a:rPr>
-              <a:t>Piracy On The Rise, Study Finds; Rates of pirated software ranged from a high of 93% in Armenia to a low of 20% in the United States, according to the 2007 BSA and IDC Global Software Piracy study. " InformationWeek.  (May 14, 2008): NA. Expanded Academic ASAP. Gale. UNIV LIBRARY AT IUPUI. 6 Aug. 2008 &lt;http://find.galegroup.com/itx/infomark.do?&amp;contentSet=IAC-Documents&amp;type=retrieve&amp;tabID=T003&amp;prodId=EAIM&amp;docId=A179009613&amp;source=gale&amp;userGroupName=iulib_iupui&amp;version=1.0&gt;. </a:t>
-            </a:r>
-            <a:endParaRPr lang="en-US" sz="1000" dirty="0"/>
-          </a:p>
-        </p:txBody>
-      </p:sp>
-      <p:sp>
-        <p:nvSpPr>
-          <p:cNvPr id="5" name="TextBox 4"/>
-          <p:cNvSpPr txBox="1"/>
-          <p:nvPr/>
-        </p:nvSpPr>
-        <p:spPr>
-          <a:xfrm>
-            <a:off x="779463" y="5029200"/>
-            <a:ext cx="7983537" cy="861774"/>
-          </a:xfrm>
-          <a:prstGeom prst="rect">
-            <a:avLst/>
-          </a:prstGeom>
-          <a:noFill/>
-        </p:spPr>
-        <p:txBody>
-          <a:bodyPr wrap="square" rtlCol="0">
-            <a:spAutoFit/>
-          </a:bodyPr>
-          <a:lstStyle/>
-          <a:p>
-            <a:r>
-              <a:rPr lang="en-US" sz="1000" dirty="0" smtClean="0"/>
-              <a:t>Scholarly article:</a:t>
-            </a:r>
-          </a:p>
-          <a:p>
-            <a:r>
-              <a:rPr lang="en-US" sz="1000" dirty="0" smtClean="0"/>
-              <a:t>Wade</a:t>
-            </a:r>
-            <a:r>
-              <a:rPr lang="en-US" sz="1000" dirty="0"/>
-              <a:t>,</a:t>
-            </a:r>
-            <a:r>
-              <a:rPr lang="en-US" sz="1000" dirty="0" smtClean="0"/>
+              <a:rPr lang="en-US" dirty="0" err="1" smtClean="0"/>
+              <a:t>main(int</a:t>
+            </a:r>
+            <a:r>
+              <a:rPr lang="en-US" dirty="0" smtClean="0"/>
               <a:t> </a:t>
             </a:r>
             <a:r>
-              <a:rPr lang="en-US" sz="1000" dirty="0" err="1" smtClean="0"/>
-              <a:t>Jared.</a:t>
-            </a:r>
-            <a:r>
-              <a:rPr lang="en-US" sz="1000" u="sng" dirty="0" err="1" smtClean="0">
-                <a:hlinkClick r:id="rId3"/>
-              </a:rPr>
-              <a:t>Steal</a:t>
-            </a:r>
-            <a:r>
-              <a:rPr lang="en-US" sz="1000" u="sng" dirty="0" smtClean="0">
-                <a:hlinkClick r:id="rId3"/>
-              </a:rPr>
+              <a:rPr lang="en-US" dirty="0" err="1" smtClean="0"/>
+              <a:t>argc</a:t>
+            </a:r>
+            <a:r>
+              <a:rPr lang="en-US" dirty="0" smtClean="0"/>
+              <a:t>, char* </a:t>
+            </a:r>
+            <a:r>
+              <a:rPr lang="en-US" dirty="0" err="1" smtClean="0"/>
+              <a:t>argv</a:t>
+            </a:r>
+            <a:r>
+              <a:rPr lang="en-US" dirty="0" smtClean="0"/>
+              <a:t>[]) </a:t>
+            </a:r>
+            <a:r>
+              <a:rPr lang="en-US" dirty="0" smtClean="0"/>
+              <a:t>{</a:t>
+            </a:r>
+          </a:p>
+          <a:p>
+            <a:endParaRPr lang="en-US" dirty="0" smtClean="0"/>
+          </a:p>
+          <a:p>
+            <a:r>
+              <a:rPr lang="en-US" dirty="0" smtClean="0"/>
+              <a:t>	</a:t>
+            </a:r>
+            <a:r>
+              <a:rPr lang="en-US" dirty="0" err="1" smtClean="0"/>
+              <a:t>UDPPlus</a:t>
+            </a:r>
+            <a:r>
+              <a:rPr lang="en-US" dirty="0" smtClean="0"/>
               <a:t> </a:t>
             </a:r>
             <a:r>
-              <a:rPr lang="en-US" sz="1000" u="sng" dirty="0">
-                <a:hlinkClick r:id="rId3"/>
-              </a:rPr>
-              <a:t>this article.(Cover story). ." Risk Management.  55.5 (May 2008): 25(10). Expanded Academic ASAP. Gale. UNIV LIBRARY AT IUPUI. 6 Aug. 2008 &lt;http://find.galegroup.com/itx/infomark.do?&amp;contentSet=IAC-Documents&amp;type=retrieve&amp;tabID=T002&amp;prodId=EAIM&amp;docId=A179160582&amp;source=gale&amp;userGroupName=iulib_iupui&amp;version=1.0&gt;. </a:t>
-            </a:r>
-            <a:endParaRPr lang="en-US" sz="1000" dirty="0"/>
+              <a:rPr lang="en-US" dirty="0" smtClean="0"/>
+              <a:t>*</a:t>
+            </a:r>
+            <a:r>
+              <a:rPr lang="en-US" dirty="0" err="1" smtClean="0"/>
+              <a:t>conn</a:t>
+            </a:r>
+            <a:r>
+              <a:rPr lang="en-US" dirty="0" smtClean="0"/>
+              <a:t> = new </a:t>
+            </a:r>
+            <a:r>
+              <a:rPr lang="en-US" dirty="0" err="1" smtClean="0"/>
+              <a:t>UDPPlus</a:t>
+            </a:r>
+            <a:r>
+              <a:rPr lang="en-US" dirty="0" smtClean="0"/>
+              <a:t>;</a:t>
+            </a:r>
+          </a:p>
+          <a:p>
+            <a:r>
+              <a:rPr lang="en-US" dirty="0" smtClean="0"/>
+              <a:t>	</a:t>
+            </a:r>
+            <a:r>
+              <a:rPr lang="en-US" dirty="0" err="1" smtClean="0"/>
+              <a:t>UDPPlusConnection</a:t>
+            </a:r>
+            <a:r>
+              <a:rPr lang="en-US" dirty="0" smtClean="0"/>
+              <a:t> </a:t>
+            </a:r>
+            <a:r>
+              <a:rPr lang="en-US" dirty="0" smtClean="0"/>
+              <a:t>*open</a:t>
+            </a:r>
+            <a:r>
+              <a:rPr lang="en-US" dirty="0" smtClean="0"/>
+              <a:t>;</a:t>
+            </a:r>
+          </a:p>
+          <a:p>
+            <a:r>
+              <a:rPr lang="en-US" dirty="0" smtClean="0"/>
+              <a:t>	</a:t>
+            </a:r>
+            <a:r>
+              <a:rPr lang="en-US" dirty="0" smtClean="0"/>
+              <a:t>const </a:t>
+            </a:r>
+            <a:r>
+              <a:rPr lang="en-US" dirty="0" err="1" smtClean="0"/>
+              <a:t>int</a:t>
+            </a:r>
+            <a:r>
+              <a:rPr lang="en-US" dirty="0" smtClean="0"/>
+              <a:t> PORT = 30000;</a:t>
+            </a:r>
+            <a:r>
+              <a:rPr lang="en-US" dirty="0" smtClean="0"/>
+              <a:t> </a:t>
+            </a:r>
+          </a:p>
+          <a:p>
+            <a:r>
+              <a:rPr lang="en-US" dirty="0" smtClean="0"/>
+              <a:t>	</a:t>
+            </a:r>
+          </a:p>
+          <a:p>
+            <a:r>
+              <a:rPr lang="en-US" dirty="0" smtClean="0"/>
+              <a:t>	</a:t>
+            </a:r>
+            <a:r>
+              <a:rPr lang="en-US" dirty="0" smtClean="0"/>
+              <a:t>/</a:t>
+            </a:r>
+            <a:r>
+              <a:rPr lang="en-US" dirty="0" smtClean="0"/>
+              <a:t>/ setup </a:t>
+            </a:r>
+            <a:r>
+              <a:rPr lang="en-US" dirty="0" err="1" smtClean="0"/>
+              <a:t>sockadr_in</a:t>
+            </a:r>
+            <a:r>
+              <a:rPr lang="en-US" dirty="0" smtClean="0"/>
+              <a:t> </a:t>
+            </a:r>
+            <a:r>
+              <a:rPr lang="en-US" dirty="0" err="1" smtClean="0"/>
+              <a:t>struct</a:t>
+            </a:r>
+            <a:endParaRPr lang="en-US" dirty="0" smtClean="0"/>
+          </a:p>
+          <a:p>
+            <a:r>
+              <a:rPr lang="en-US" dirty="0" smtClean="0"/>
+              <a:t>	</a:t>
+            </a:r>
+            <a:r>
+              <a:rPr lang="en-US" dirty="0" err="1" smtClean="0"/>
+              <a:t>struct</a:t>
+            </a:r>
+            <a:r>
+              <a:rPr lang="en-US" dirty="0" smtClean="0"/>
+              <a:t> </a:t>
+            </a:r>
+            <a:r>
+              <a:rPr lang="en-US" dirty="0" err="1" smtClean="0"/>
+              <a:t>sockaddr_in</a:t>
+            </a:r>
+            <a:r>
+              <a:rPr lang="en-US" dirty="0" smtClean="0"/>
+              <a:t> local</a:t>
+            </a:r>
+            <a:r>
+              <a:rPr lang="en-US" dirty="0" smtClean="0"/>
+              <a:t>;</a:t>
+            </a:r>
+          </a:p>
+          <a:p>
+            <a:r>
+              <a:rPr lang="en-US" dirty="0" smtClean="0"/>
+              <a:t>	</a:t>
+            </a:r>
+            <a:r>
+              <a:rPr lang="en-US" dirty="0" err="1" smtClean="0"/>
+              <a:t>memset</a:t>
+            </a:r>
+            <a:r>
+              <a:rPr lang="en-US" dirty="0" err="1" smtClean="0"/>
+              <a:t>((char</a:t>
+            </a:r>
+            <a:r>
+              <a:rPr lang="en-US" dirty="0" smtClean="0"/>
+              <a:t> *) &amp;local, 0, </a:t>
+            </a:r>
+            <a:r>
+              <a:rPr lang="en-US" dirty="0" err="1" smtClean="0"/>
+              <a:t>sizeof(local</a:t>
+            </a:r>
+            <a:r>
+              <a:rPr lang="en-US" dirty="0" smtClean="0"/>
+              <a:t>))</a:t>
+            </a:r>
+            <a:r>
+              <a:rPr lang="en-US" dirty="0" smtClean="0"/>
+              <a:t>;</a:t>
+            </a:r>
+          </a:p>
+          <a:p>
+            <a:r>
+              <a:rPr lang="en-US" dirty="0" smtClean="0"/>
+              <a:t>	</a:t>
+            </a:r>
+            <a:r>
+              <a:rPr lang="en-US" dirty="0" err="1" smtClean="0"/>
+              <a:t>local.sin_family</a:t>
+            </a:r>
+            <a:r>
+              <a:rPr lang="en-US" dirty="0" smtClean="0"/>
+              <a:t> </a:t>
+            </a:r>
+            <a:r>
+              <a:rPr lang="en-US" dirty="0" smtClean="0"/>
+              <a:t>= AF_INET</a:t>
+            </a:r>
+            <a:r>
+              <a:rPr lang="en-US" dirty="0" smtClean="0"/>
+              <a:t>;</a:t>
+            </a:r>
+          </a:p>
+          <a:p>
+            <a:r>
+              <a:rPr lang="en-US" dirty="0" smtClean="0"/>
+              <a:t>	</a:t>
+            </a:r>
+            <a:r>
+              <a:rPr lang="en-US" dirty="0" err="1" smtClean="0"/>
+              <a:t>local.sin_port</a:t>
+            </a:r>
+            <a:r>
+              <a:rPr lang="en-US" dirty="0" smtClean="0"/>
+              <a:t> </a:t>
+            </a:r>
+            <a:r>
+              <a:rPr lang="en-US" dirty="0" smtClean="0"/>
+              <a:t>= </a:t>
+            </a:r>
+            <a:r>
+              <a:rPr lang="en-US" dirty="0" err="1" smtClean="0"/>
+              <a:t>htons(PORT</a:t>
+            </a:r>
+            <a:r>
+              <a:rPr lang="en-US" dirty="0" smtClean="0"/>
+              <a:t>)</a:t>
+            </a:r>
+            <a:r>
+              <a:rPr lang="en-US" dirty="0" smtClean="0"/>
+              <a:t>;</a:t>
+            </a:r>
+          </a:p>
+          <a:p>
+            <a:r>
+              <a:rPr lang="en-US" dirty="0" smtClean="0"/>
+              <a:t>       </a:t>
+            </a:r>
+            <a:r>
+              <a:rPr lang="en-US" dirty="0" err="1" smtClean="0"/>
+              <a:t>local.sin_addr.s_addr</a:t>
+            </a:r>
+            <a:r>
+              <a:rPr lang="en-US" dirty="0" smtClean="0"/>
+              <a:t> </a:t>
+            </a:r>
+            <a:r>
+              <a:rPr lang="en-US" dirty="0" smtClean="0"/>
+              <a:t>= AI_PASSIVE</a:t>
+            </a:r>
+            <a:r>
+              <a:rPr lang="en-US" dirty="0" smtClean="0"/>
+              <a:t>;</a:t>
+            </a:r>
+          </a:p>
+          <a:p>
+            <a:endParaRPr lang="en-US" dirty="0" smtClean="0"/>
+          </a:p>
+          <a:p>
+            <a:r>
+              <a:rPr lang="en-US" dirty="0" smtClean="0"/>
+              <a:t>	</a:t>
+            </a:r>
+            <a:r>
+              <a:rPr lang="en-US" dirty="0" err="1" smtClean="0"/>
+              <a:t>conn</a:t>
+            </a:r>
+            <a:r>
+              <a:rPr lang="en-US" dirty="0" smtClean="0"/>
+              <a:t>-&gt;</a:t>
+            </a:r>
+            <a:r>
+              <a:rPr lang="en-US" dirty="0" err="1" smtClean="0"/>
+              <a:t>bind_p(&amp;local</a:t>
+            </a:r>
+            <a:r>
+              <a:rPr lang="en-US" dirty="0" smtClean="0"/>
+              <a:t>, </a:t>
+            </a:r>
+            <a:r>
+              <a:rPr lang="en-US" dirty="0" err="1" smtClean="0"/>
+              <a:t>sizeof(local</a:t>
+            </a:r>
+            <a:r>
+              <a:rPr lang="en-US" dirty="0" smtClean="0"/>
+              <a:t>));</a:t>
+            </a:r>
+          </a:p>
+          <a:p>
+            <a:r>
+              <a:rPr lang="en-US" dirty="0" smtClean="0"/>
+              <a:t>	open </a:t>
+            </a:r>
+            <a:r>
+              <a:rPr lang="en-US" dirty="0" smtClean="0"/>
+              <a:t>= </a:t>
+            </a:r>
+            <a:r>
+              <a:rPr lang="en-US" dirty="0" err="1" smtClean="0"/>
+              <a:t>conn</a:t>
+            </a:r>
+            <a:r>
+              <a:rPr lang="en-US" dirty="0" smtClean="0"/>
+              <a:t>-&gt;</a:t>
+            </a:r>
+            <a:r>
+              <a:rPr lang="en-US" dirty="0" err="1" smtClean="0"/>
+              <a:t>accept_p</a:t>
+            </a:r>
+            <a:r>
+              <a:rPr lang="en-US" dirty="0" smtClean="0"/>
+              <a:t>()</a:t>
+            </a:r>
+            <a:r>
+              <a:rPr lang="en-US" dirty="0" smtClean="0"/>
+              <a:t>;</a:t>
+            </a:r>
+          </a:p>
+          <a:p>
+            <a:endParaRPr lang="en-US" dirty="0" smtClean="0"/>
+          </a:p>
+          <a:p>
+            <a:r>
+              <a:rPr lang="en-US" dirty="0" smtClean="0"/>
+              <a:t>	return 0;</a:t>
+            </a:r>
+          </a:p>
+          <a:p>
+            <a:r>
+              <a:rPr lang="en-US" dirty="0" smtClean="0"/>
+              <a:t>}</a:t>
+            </a:r>
+            <a:endParaRPr lang="en-US" dirty="0"/>
           </a:p>
         </p:txBody>
       </p:sp>

</xml_diff>

<commit_message>
added comments to UDPPlusConnection header, changes presentation
</commit_message>
<xml_diff>
--- a/Presentation.pptx
+++ b/Presentation.pptx
@@ -347,7 +347,7 @@
             <a:fld id="{0CFA9B12-FE9D-8843-AB46-63C63099F56D}" type="datetimeFigureOut">
               <a:rPr lang="en-US" smtClean="0"/>
               <a:pPr/>
-              <a:t>4/25/10</a:t>
+              <a:t>4/27/10</a:t>
             </a:fld>
             <a:endParaRPr lang="en-US"/>
           </a:p>
@@ -439,7 +439,7 @@
             <a:fld id="{0CFA9B12-FE9D-8843-AB46-63C63099F56D}" type="datetimeFigureOut">
               <a:rPr lang="en-US" smtClean="0"/>
               <a:pPr/>
-              <a:t>4/25/10</a:t>
+              <a:t>4/27/10</a:t>
             </a:fld>
             <a:endParaRPr lang="en-US"/>
           </a:p>
@@ -741,7 +741,7 @@
             <a:fld id="{0CFA9B12-FE9D-8843-AB46-63C63099F56D}" type="datetimeFigureOut">
               <a:rPr lang="en-US" smtClean="0"/>
               <a:pPr/>
-              <a:t>4/25/10</a:t>
+              <a:t>4/27/10</a:t>
             </a:fld>
             <a:endParaRPr lang="en-US"/>
           </a:p>
@@ -961,7 +961,7 @@
             <a:fld id="{0CFA9B12-FE9D-8843-AB46-63C63099F56D}" type="datetimeFigureOut">
               <a:rPr lang="en-US" smtClean="0"/>
               <a:pPr/>
-              <a:t>4/25/10</a:t>
+              <a:t>4/27/10</a:t>
             </a:fld>
             <a:endParaRPr lang="en-US"/>
           </a:p>
@@ -1348,7 +1348,7 @@
             <a:fld id="{0CFA9B12-FE9D-8843-AB46-63C63099F56D}" type="datetimeFigureOut">
               <a:rPr lang="en-US" smtClean="0"/>
               <a:pPr/>
-              <a:t>4/25/10</a:t>
+              <a:t>4/27/10</a:t>
             </a:fld>
             <a:endParaRPr lang="en-US"/>
           </a:p>
@@ -1658,7 +1658,7 @@
             <a:fld id="{0CFA9B12-FE9D-8843-AB46-63C63099F56D}" type="datetimeFigureOut">
               <a:rPr lang="en-US" smtClean="0"/>
               <a:pPr/>
-              <a:t>4/25/10</a:t>
+              <a:t>4/27/10</a:t>
             </a:fld>
             <a:endParaRPr lang="en-US"/>
           </a:p>
@@ -1854,7 +1854,7 @@
             <a:fld id="{0CFA9B12-FE9D-8843-AB46-63C63099F56D}" type="datetimeFigureOut">
               <a:rPr lang="en-US" smtClean="0"/>
               <a:pPr/>
-              <a:t>4/25/10</a:t>
+              <a:t>4/27/10</a:t>
             </a:fld>
             <a:endParaRPr lang="en-US"/>
           </a:p>
@@ -2055,7 +2055,7 @@
             <a:fld id="{0CFA9B12-FE9D-8843-AB46-63C63099F56D}" type="datetimeFigureOut">
               <a:rPr lang="en-US" smtClean="0"/>
               <a:pPr/>
-              <a:t>4/25/10</a:t>
+              <a:t>4/27/10</a:t>
             </a:fld>
             <a:endParaRPr lang="en-US"/>
           </a:p>
@@ -2246,7 +2246,7 @@
             <a:fld id="{0CFA9B12-FE9D-8843-AB46-63C63099F56D}" type="datetimeFigureOut">
               <a:rPr lang="en-US" smtClean="0"/>
               <a:pPr/>
-              <a:t>4/25/10</a:t>
+              <a:t>4/27/10</a:t>
             </a:fld>
             <a:endParaRPr lang="en-US"/>
           </a:p>
@@ -2520,7 +2520,7 @@
             <a:fld id="{0A6DB27C-A513-4C42-B94B-53B99CD8A008}" type="datetime1">
               <a:rPr lang="en-US" smtClean="0"/>
               <a:pPr/>
-              <a:t>4/25/10</a:t>
+              <a:t>4/27/10</a:t>
             </a:fld>
             <a:endParaRPr lang="en-US"/>
           </a:p>
@@ -2833,7 +2833,7 @@
             <a:fld id="{0CFA9B12-FE9D-8843-AB46-63C63099F56D}" type="datetimeFigureOut">
               <a:rPr lang="en-US" smtClean="0"/>
               <a:pPr/>
-              <a:t>4/25/10</a:t>
+              <a:t>4/27/10</a:t>
             </a:fld>
             <a:endParaRPr lang="en-US"/>
           </a:p>
@@ -3301,7 +3301,7 @@
             <a:fld id="{0CFA9B12-FE9D-8843-AB46-63C63099F56D}" type="datetimeFigureOut">
               <a:rPr lang="en-US" smtClean="0"/>
               <a:pPr/>
-              <a:t>4/25/10</a:t>
+              <a:t>4/27/10</a:t>
             </a:fld>
             <a:endParaRPr lang="en-US"/>
           </a:p>
@@ -3667,7 +3667,7 @@
             <a:fld id="{0CFA9B12-FE9D-8843-AB46-63C63099F56D}" type="datetimeFigureOut">
               <a:rPr lang="en-US" smtClean="0"/>
               <a:pPr/>
-              <a:t>4/25/10</a:t>
+              <a:t>4/27/10</a:t>
             </a:fld>
             <a:endParaRPr lang="en-US"/>
           </a:p>
@@ -3980,7 +3980,7 @@
             <a:fld id="{0CFA9B12-FE9D-8843-AB46-63C63099F56D}" type="datetimeFigureOut">
               <a:rPr lang="en-US" smtClean="0"/>
               <a:pPr/>
-              <a:t>4/25/10</a:t>
+              <a:t>4/27/10</a:t>
             </a:fld>
             <a:endParaRPr lang="en-US"/>
           </a:p>
@@ -4293,7 +4293,7 @@
             <a:fld id="{0CFA9B12-FE9D-8843-AB46-63C63099F56D}" type="datetimeFigureOut">
               <a:rPr lang="en-US" smtClean="0"/>
               <a:pPr/>
-              <a:t>4/25/10</a:t>
+              <a:t>4/27/10</a:t>
             </a:fld>
             <a:endParaRPr lang="en-US"/>
           </a:p>
@@ -4780,7 +4780,7 @@
             <a:fld id="{0CFA9B12-FE9D-8843-AB46-63C63099F56D}" type="datetimeFigureOut">
               <a:rPr lang="en-US" smtClean="0"/>
               <a:pPr/>
-              <a:t>4/25/10</a:t>
+              <a:t>4/27/10</a:t>
             </a:fld>
             <a:endParaRPr lang="en-US"/>
           </a:p>
@@ -5045,7 +5045,7 @@
             <a:fld id="{0CFA9B12-FE9D-8843-AB46-63C63099F56D}" type="datetimeFigureOut">
               <a:rPr lang="en-US" smtClean="0"/>
               <a:pPr/>
-              <a:t>4/25/10</a:t>
+              <a:t>4/27/10</a:t>
             </a:fld>
             <a:endParaRPr lang="en-US"/>
           </a:p>
@@ -5481,11 +5481,7 @@
             </a:r>
             <a:r>
               <a:rPr lang="en-US" dirty="0" smtClean="0"/>
-              <a:t> and</a:t>
-            </a:r>
-            <a:r>
-              <a:rPr lang="en-US" dirty="0" smtClean="0"/>
-              <a:t> </a:t>
+              <a:t> and </a:t>
             </a:r>
             <a:r>
               <a:rPr lang="en-US" dirty="0" err="1" smtClean="0"/>
@@ -5593,13 +5589,8 @@
           <a:p>
             <a:r>
               <a:rPr lang="en-US" dirty="0" smtClean="0"/>
-              <a:t>Many simultaneous connections (using </a:t>
-            </a:r>
-            <a:r>
-              <a:rPr lang="en-US" dirty="0" smtClean="0"/>
-              <a:t>threads)</a:t>
-            </a:r>
-            <a:endParaRPr lang="en-US" dirty="0" smtClean="0"/>
+              <a:t>Many simultaneous connections (using threads)</a:t>
+            </a:r>
           </a:p>
         </p:txBody>
       </p:sp>
@@ -5657,7 +5648,7 @@
           <a:p>
             <a:r>
               <a:rPr lang="en-US" dirty="0" smtClean="0"/>
-              <a:t>Example client program</a:t>
+              <a:t>Packet Header</a:t>
             </a:r>
             <a:endParaRPr lang="en-US" dirty="0"/>
           </a:p>
@@ -5672,7 +5663,7 @@
         <p:spPr>
           <a:xfrm>
             <a:off x="762000" y="1812162"/>
-            <a:ext cx="8382000" cy="4524316"/>
+            <a:ext cx="8382000" cy="3816429"/>
           </a:xfrm>
           <a:prstGeom prst="rect">
             <a:avLst/>
@@ -5686,319 +5677,160 @@
           <a:lstStyle/>
           <a:p>
             <a:r>
-              <a:rPr lang="en-US" dirty="0" err="1" smtClean="0"/>
-              <a:t>int</a:t>
-            </a:r>
-            <a:r>
               <a:rPr lang="en-US" dirty="0" smtClean="0"/>
               <a:t> </a:t>
             </a:r>
             <a:r>
-              <a:rPr lang="en-US" dirty="0" err="1" smtClean="0"/>
-              <a:t>main(int</a:t>
-            </a:r>
-            <a:r>
-              <a:rPr lang="en-US" dirty="0" smtClean="0"/>
-              <a:t> </a:t>
-            </a:r>
-            <a:r>
-              <a:rPr lang="en-US" dirty="0" err="1" smtClean="0"/>
-              <a:t>argc</a:t>
-            </a:r>
-            <a:r>
-              <a:rPr lang="en-US" dirty="0" smtClean="0"/>
-              <a:t>, char* </a:t>
-            </a:r>
-            <a:r>
-              <a:rPr lang="en-US" dirty="0" err="1" smtClean="0"/>
-              <a:t>argv</a:t>
-            </a:r>
-            <a:r>
-              <a:rPr lang="en-US" dirty="0" smtClean="0"/>
-              <a:t>[]) {   </a:t>
-            </a:r>
-            <a:r>
-              <a:rPr lang="en-US" dirty="0" smtClean="0"/>
-              <a:t> </a:t>
-            </a:r>
-          </a:p>
-          <a:p>
-            <a:r>
-              <a:rPr lang="en-US" dirty="0" smtClean="0"/>
-              <a:t>	</a:t>
-            </a:r>
-            <a:r>
-              <a:rPr lang="en-US" dirty="0" err="1" smtClean="0"/>
-              <a:t>UDPPlus</a:t>
-            </a:r>
-            <a:r>
-              <a:rPr lang="en-US" dirty="0" smtClean="0"/>
-              <a:t> </a:t>
-            </a:r>
-            <a:r>
-              <a:rPr lang="en-US" dirty="0" smtClean="0"/>
-              <a:t>*</a:t>
-            </a:r>
-            <a:r>
-              <a:rPr lang="en-US" dirty="0" err="1" smtClean="0"/>
-              <a:t>conn</a:t>
-            </a:r>
-            <a:r>
-              <a:rPr lang="en-US" dirty="0" smtClean="0"/>
-              <a:t> = new </a:t>
-            </a:r>
-            <a:r>
-              <a:rPr lang="en-US" dirty="0" err="1" smtClean="0"/>
-              <a:t>UDPPlus</a:t>
-            </a:r>
-            <a:r>
-              <a:rPr lang="en-US" dirty="0" smtClean="0"/>
-              <a:t>;</a:t>
-            </a:r>
-          </a:p>
-          <a:p>
-            <a:r>
-              <a:rPr lang="en-US" dirty="0" smtClean="0"/>
-              <a:t>	</a:t>
-            </a:r>
-            <a:r>
-              <a:rPr lang="en-US" dirty="0" err="1" smtClean="0"/>
-              <a:t>UDPPlusConnection</a:t>
-            </a:r>
-            <a:r>
-              <a:rPr lang="en-US" dirty="0" smtClean="0"/>
-              <a:t> </a:t>
-            </a:r>
-            <a:r>
-              <a:rPr lang="en-US" dirty="0" smtClean="0"/>
-              <a:t>*open</a:t>
-            </a:r>
-            <a:r>
-              <a:rPr lang="en-US" dirty="0" smtClean="0"/>
-              <a:t>;</a:t>
-            </a:r>
-          </a:p>
-          <a:p>
-            <a:r>
-              <a:rPr lang="en-US" dirty="0" smtClean="0"/>
-              <a:t>	const </a:t>
-            </a:r>
-            <a:r>
-              <a:rPr lang="en-US" dirty="0" err="1" smtClean="0"/>
-              <a:t>int</a:t>
-            </a:r>
-            <a:r>
-              <a:rPr lang="en-US" dirty="0" smtClean="0"/>
-              <a:t> PORT = 30000</a:t>
-            </a:r>
-            <a:r>
-              <a:rPr lang="en-US" dirty="0" smtClean="0"/>
-              <a:t>;</a:t>
-            </a:r>
-          </a:p>
-          <a:p>
-            <a:endParaRPr lang="en-US" dirty="0" smtClean="0"/>
-          </a:p>
-          <a:p>
-            <a:r>
-              <a:rPr lang="en-US" dirty="0" smtClean="0"/>
-              <a:t>	/</a:t>
-            </a:r>
-            <a:r>
-              <a:rPr lang="en-US" dirty="0" smtClean="0"/>
-              <a:t>/ setup </a:t>
-            </a:r>
-            <a:r>
-              <a:rPr lang="en-US" dirty="0" err="1" smtClean="0"/>
-              <a:t>sockaddr_in</a:t>
-            </a:r>
-            <a:r>
-              <a:rPr lang="en-US" dirty="0" smtClean="0"/>
-              <a:t> </a:t>
-            </a:r>
-            <a:r>
-              <a:rPr lang="en-US" dirty="0" err="1" smtClean="0"/>
-              <a:t>struct</a:t>
-            </a:r>
-            <a:endParaRPr lang="en-US" dirty="0" smtClean="0"/>
-          </a:p>
-          <a:p>
-            <a:r>
-              <a:rPr lang="en-US" dirty="0" smtClean="0"/>
-              <a:t>	</a:t>
-            </a:r>
-            <a:r>
-              <a:rPr lang="en-US" dirty="0" err="1" smtClean="0"/>
-              <a:t>struct</a:t>
-            </a:r>
-            <a:r>
-              <a:rPr lang="en-US" dirty="0" smtClean="0"/>
-              <a:t> </a:t>
-            </a:r>
-            <a:r>
-              <a:rPr lang="en-US" dirty="0" err="1" smtClean="0"/>
-              <a:t>sockaddr_in</a:t>
-            </a:r>
-            <a:r>
-              <a:rPr lang="en-US" dirty="0" smtClean="0"/>
-              <a:t> host</a:t>
-            </a:r>
-            <a:r>
-              <a:rPr lang="en-US" dirty="0" smtClean="0"/>
-              <a:t>;</a:t>
-            </a:r>
-          </a:p>
-          <a:p>
-            <a:r>
-              <a:rPr lang="en-US" dirty="0" smtClean="0"/>
-              <a:t>	</a:t>
-            </a:r>
-            <a:r>
-              <a:rPr lang="en-US" dirty="0" err="1" smtClean="0"/>
-              <a:t>memset</a:t>
-            </a:r>
-            <a:r>
-              <a:rPr lang="en-US" dirty="0" err="1" smtClean="0"/>
-              <a:t>((char</a:t>
-            </a:r>
-            <a:r>
-              <a:rPr lang="en-US" dirty="0" smtClean="0"/>
-              <a:t> *) &amp;host, 0, </a:t>
-            </a:r>
-            <a:r>
-              <a:rPr lang="en-US" dirty="0" err="1" smtClean="0"/>
-              <a:t>sizeof(host</a:t>
-            </a:r>
-            <a:r>
-              <a:rPr lang="en-US" dirty="0" smtClean="0"/>
-              <a:t>))</a:t>
-            </a:r>
-            <a:r>
-              <a:rPr lang="en-US" dirty="0" smtClean="0"/>
-              <a:t>;</a:t>
-            </a:r>
-          </a:p>
-          <a:p>
-            <a:r>
-              <a:rPr lang="en-US" dirty="0" smtClean="0"/>
-              <a:t>	</a:t>
-            </a:r>
-            <a:r>
-              <a:rPr lang="en-US" dirty="0" err="1" smtClean="0"/>
-              <a:t>host.sin_family</a:t>
-            </a:r>
-            <a:r>
-              <a:rPr lang="en-US" dirty="0" smtClean="0"/>
-              <a:t> </a:t>
-            </a:r>
-            <a:r>
-              <a:rPr lang="en-US" dirty="0" smtClean="0"/>
-              <a:t>= AF_INET</a:t>
-            </a:r>
-            <a:r>
-              <a:rPr lang="en-US" dirty="0" smtClean="0"/>
-              <a:t>;</a:t>
-            </a:r>
-          </a:p>
-          <a:p>
-            <a:r>
-              <a:rPr lang="en-US" dirty="0" smtClean="0"/>
-              <a:t>	host	.</a:t>
-            </a:r>
-            <a:r>
-              <a:rPr lang="en-US" dirty="0" err="1" smtClean="0"/>
-              <a:t>sin_port</a:t>
-            </a:r>
-            <a:r>
-              <a:rPr lang="en-US" dirty="0" smtClean="0"/>
-              <a:t> </a:t>
-            </a:r>
-            <a:r>
-              <a:rPr lang="en-US" dirty="0" smtClean="0"/>
-              <a:t>= </a:t>
-            </a:r>
-            <a:r>
-              <a:rPr lang="en-US" dirty="0" err="1" smtClean="0"/>
-              <a:t>htons(PORT</a:t>
-            </a:r>
-            <a:r>
-              <a:rPr lang="en-US" dirty="0" smtClean="0"/>
-              <a:t>);</a:t>
-            </a:r>
-          </a:p>
-          <a:p>
-            <a:r>
-              <a:rPr lang="en-US" dirty="0" smtClean="0"/>
-              <a:t>	</a:t>
-            </a:r>
-          </a:p>
-          <a:p>
-            <a:r>
-              <a:rPr lang="en-US" dirty="0" smtClean="0"/>
-              <a:t>	// connect to server</a:t>
-            </a:r>
-          </a:p>
-          <a:p>
-            <a:r>
-              <a:rPr lang="en-US" dirty="0" smtClean="0"/>
-              <a:t>	open </a:t>
-            </a:r>
-            <a:r>
-              <a:rPr lang="en-US" dirty="0" smtClean="0"/>
-              <a:t>= </a:t>
-            </a:r>
-            <a:r>
-              <a:rPr lang="en-US" dirty="0" err="1" smtClean="0"/>
-              <a:t>conn</a:t>
-            </a:r>
-            <a:r>
-              <a:rPr lang="en-US" dirty="0" smtClean="0"/>
-              <a:t>-&gt;</a:t>
-            </a:r>
-            <a:r>
-              <a:rPr lang="en-US" dirty="0" err="1" smtClean="0"/>
-              <a:t>conn(&amp;host</a:t>
-            </a:r>
-            <a:r>
-              <a:rPr lang="en-US" dirty="0" smtClean="0"/>
-              <a:t>, </a:t>
-            </a:r>
-            <a:r>
-              <a:rPr lang="en-US" dirty="0" err="1" smtClean="0"/>
-              <a:t>sizeof(host</a:t>
-            </a:r>
-            <a:r>
-              <a:rPr lang="en-US" dirty="0" smtClean="0"/>
-              <a:t>)</a:t>
-            </a:r>
-            <a:r>
-              <a:rPr lang="en-US" dirty="0" smtClean="0"/>
-              <a:t>);</a:t>
-            </a:r>
-          </a:p>
-          <a:p>
-            <a:endParaRPr lang="en-US" dirty="0" smtClean="0"/>
-          </a:p>
-          <a:p>
-            <a:r>
-              <a:rPr lang="en-US" dirty="0" smtClean="0"/>
-              <a:t>	return </a:t>
-            </a:r>
-            <a:r>
-              <a:rPr lang="en-US" dirty="0" smtClean="0"/>
-              <a:t>0</a:t>
-            </a:r>
-            <a:r>
-              <a:rPr lang="en-US" dirty="0" smtClean="0"/>
-              <a:t>;</a:t>
-            </a:r>
-          </a:p>
-          <a:p>
-            <a:r>
-              <a:rPr lang="en-US" dirty="0" smtClean="0"/>
-              <a:t>}</a:t>
-            </a:r>
-            <a:endParaRPr lang="en-US" dirty="0"/>
+              <a:rPr lang="en-US" sz="1400" dirty="0" smtClean="0">
+                <a:latin typeface="Monaco"/>
+                <a:cs typeface="Monaco"/>
+              </a:rPr>
+              <a:t>0                   1                   2                   3</a:t>
+            </a:r>
+          </a:p>
+          <a:p>
+            <a:r>
+              <a:rPr lang="en-US" sz="1400" dirty="0" smtClean="0">
+                <a:latin typeface="Monaco"/>
+                <a:cs typeface="Monaco"/>
+              </a:rPr>
+              <a:t> 0 1 2 3 4 5 6 7 8 9 0 1 2 3 4 5 6 7 8 9 0 1 2 3 4 5 6 7 8 9 0 1</a:t>
+            </a:r>
+          </a:p>
+          <a:p>
+            <a:r>
+              <a:rPr lang="en-US" sz="1400" dirty="0" smtClean="0">
+                <a:latin typeface="Monaco"/>
+                <a:cs typeface="Monaco"/>
+              </a:rPr>
+              <a:t>+-+-+-+-+-+-+-+-+-+-+-+-+-+-+-+-+-+-+-+-+-+-+-+-+-+-+-+-+-+-+-+-+</a:t>
+            </a:r>
+          </a:p>
+          <a:p>
+            <a:r>
+              <a:rPr lang="en-US" sz="1400" dirty="0" smtClean="0">
+                <a:latin typeface="Monaco"/>
+                <a:cs typeface="Monaco"/>
+              </a:rPr>
+              <a:t>|          Source Port          |       Destination Port        |</a:t>
+            </a:r>
+          </a:p>
+          <a:p>
+            <a:r>
+              <a:rPr lang="en-US" sz="1400" dirty="0" smtClean="0">
+                <a:latin typeface="Monaco"/>
+                <a:cs typeface="Monaco"/>
+              </a:rPr>
+              <a:t>+-+-+-+-+-+-+-+-+-+-+-+-+-+-+-+-+-+-+-+-+-+-+-+-+-+-+-+-+-+-+-+-+</a:t>
+            </a:r>
+          </a:p>
+          <a:p>
+            <a:r>
+              <a:rPr lang="en-US" sz="1400" dirty="0" smtClean="0">
+                <a:latin typeface="Monaco"/>
+                <a:cs typeface="Monaco"/>
+              </a:rPr>
+              <a:t>|            Length             |           Checksum            |</a:t>
+            </a:r>
+          </a:p>
+          <a:p>
+            <a:r>
+              <a:rPr lang="en-US" sz="1400" dirty="0" smtClean="0">
+                <a:latin typeface="Monaco"/>
+                <a:cs typeface="Monaco"/>
+              </a:rPr>
+              <a:t>+-+-+-+-+-+-+-+-+-+-+-+-+-+-+-+-+-+-+-+-+-+-+-+-+-+-+-+-+-+-+-+-+</a:t>
+            </a:r>
+          </a:p>
+          <a:p>
+            <a:r>
+              <a:rPr lang="en-US" sz="1400" dirty="0" smtClean="0">
+                <a:latin typeface="Monaco"/>
+                <a:cs typeface="Monaco"/>
+              </a:rPr>
+              <a:t>|S|A|S|F|O|     |    Header     |                               |</a:t>
+            </a:r>
+          </a:p>
+          <a:p>
+            <a:r>
+              <a:rPr lang="en-US" sz="1400" dirty="0" smtClean="0">
+                <a:latin typeface="Monaco"/>
+                <a:cs typeface="Monaco"/>
+              </a:rPr>
+              <a:t>|E|C|Y|I|P|     |    Length     |           Sequence #          |</a:t>
+            </a:r>
+          </a:p>
+          <a:p>
+            <a:r>
+              <a:rPr lang="en-US" sz="1400" dirty="0" smtClean="0">
+                <a:latin typeface="Monaco"/>
+                <a:cs typeface="Monaco"/>
+              </a:rPr>
+              <a:t>|Q|Q|N|N|T|     |               |                               |</a:t>
+            </a:r>
+          </a:p>
+          <a:p>
+            <a:r>
+              <a:rPr lang="en-US" sz="1400" dirty="0" smtClean="0">
+                <a:latin typeface="Monaco"/>
+                <a:cs typeface="Monaco"/>
+              </a:rPr>
+              <a:t>+-+-+-+-+-+-+-+-+-+-+-+-+-+-+-+-+-+-+-+-+-+-+-+-+-+-+-+-+-+-+-+-+</a:t>
+            </a:r>
+          </a:p>
+          <a:p>
+            <a:r>
+              <a:rPr lang="en-US" sz="1400" dirty="0" smtClean="0">
+                <a:latin typeface="Monaco"/>
+                <a:cs typeface="Monaco"/>
+              </a:rPr>
+              <a:t>|                               |   Optional Field For SACK     |</a:t>
+            </a:r>
+          </a:p>
+          <a:p>
+            <a:r>
+              <a:rPr lang="en-US" sz="1400" dirty="0" smtClean="0">
+                <a:latin typeface="Monaco"/>
+                <a:cs typeface="Monaco"/>
+              </a:rPr>
+              <a:t>|        Acknowledgment #       |  Controlled by OPT BIT and    |</a:t>
+            </a:r>
+          </a:p>
+          <a:p>
+            <a:r>
+              <a:rPr lang="en-US" sz="1400" dirty="0" smtClean="0">
+                <a:latin typeface="Monaco"/>
+                <a:cs typeface="Monaco"/>
+              </a:rPr>
+              <a:t>|                               |       Header Length           |</a:t>
+            </a:r>
+          </a:p>
+          <a:p>
+            <a:r>
+              <a:rPr lang="en-US" sz="1400" dirty="0" smtClean="0">
+                <a:latin typeface="Monaco"/>
+                <a:cs typeface="Monaco"/>
+              </a:rPr>
+              <a:t>+-+-+-+-+-+-+-+-+-+-+-+-+-+-+-+-+-+-+-+-+-+-+-+-+-+-+-+-+-+-+-+-+</a:t>
+            </a:r>
+          </a:p>
+          <a:p>
+            <a:r>
+              <a:rPr lang="en-US" sz="1400" dirty="0" smtClean="0">
+                <a:latin typeface="Monaco"/>
+                <a:cs typeface="Monaco"/>
+              </a:rPr>
+              <a:t>|                             data                              |</a:t>
+            </a:r>
+          </a:p>
+          <a:p>
+            <a:r>
+              <a:rPr lang="en-US" sz="1400" dirty="0" smtClean="0">
+                <a:latin typeface="Monaco"/>
+                <a:cs typeface="Monaco"/>
+              </a:rPr>
+              <a:t>+-+-+-+-+-+-+-+-+-+-+-+-+-+-+-+-+-+-+-+-+-+-+-+-+-+-+-+-+-+-+-+-+</a:t>
+            </a:r>
           </a:p>
         </p:txBody>
       </p:sp>
@@ -6109,11 +5941,7 @@
             </a:r>
             <a:r>
               <a:rPr lang="en-US" dirty="0" smtClean="0"/>
-              <a:t>[]) </a:t>
-            </a:r>
-            <a:r>
-              <a:rPr lang="en-US" dirty="0" smtClean="0"/>
-              <a:t>{</a:t>
+              <a:t>[]) {</a:t>
             </a:r>
           </a:p>
           <a:p>
@@ -6130,11 +5958,7 @@
             </a:r>
             <a:r>
               <a:rPr lang="en-US" dirty="0" smtClean="0"/>
-              <a:t> </a:t>
-            </a:r>
-            <a:r>
-              <a:rPr lang="en-US" dirty="0" smtClean="0"/>
-              <a:t>*</a:t>
+              <a:t> *</a:t>
             </a:r>
             <a:r>
               <a:rPr lang="en-US" dirty="0" err="1" smtClean="0"/>
@@ -6164,15 +5988,21 @@
             </a:r>
             <a:r>
               <a:rPr lang="en-US" dirty="0" smtClean="0"/>
-              <a:t> </a:t>
-            </a:r>
+              <a:t> *open;</a:t>
+            </a:r>
+          </a:p>
+          <a:p>
             <a:r>
               <a:rPr lang="en-US" dirty="0" smtClean="0"/>
-              <a:t>*open</a:t>
+              <a:t>	const </a:t>
+            </a:r>
+            <a:r>
+              <a:rPr lang="en-US" dirty="0" err="1" smtClean="0"/>
+              <a:t>int</a:t>
             </a:r>
             <a:r>
               <a:rPr lang="en-US" dirty="0" smtClean="0"/>
-              <a:t>;</a:t>
+              <a:t> PORT = 30000; </a:t>
             </a:r>
           </a:p>
           <a:p>
@@ -6180,28 +6010,47 @@
               <a:rPr lang="en-US" dirty="0" smtClean="0"/>
               <a:t>	</a:t>
             </a:r>
+          </a:p>
+          <a:p>
             <a:r>
               <a:rPr lang="en-US" dirty="0" smtClean="0"/>
-              <a:t>const </a:t>
+              <a:t>	// setup </a:t>
             </a:r>
             <a:r>
               <a:rPr lang="en-US" dirty="0" err="1" smtClean="0"/>
-              <a:t>int</a:t>
-            </a:r>
-            <a:r>
-              <a:rPr lang="en-US" dirty="0" smtClean="0"/>
-              <a:t> PORT = 30000;</a:t>
+              <a:t>sockadr_in</a:t>
             </a:r>
             <a:r>
               <a:rPr lang="en-US" dirty="0" smtClean="0"/>
               <a:t> </a:t>
             </a:r>
+            <a:r>
+              <a:rPr lang="en-US" dirty="0" err="1" smtClean="0"/>
+              <a:t>struct</a:t>
+            </a:r>
+            <a:endParaRPr lang="en-US" dirty="0" smtClean="0"/>
           </a:p>
           <a:p>
             <a:r>
               <a:rPr lang="en-US" dirty="0" smtClean="0"/>
               <a:t>	</a:t>
             </a:r>
+            <a:r>
+              <a:rPr lang="en-US" dirty="0" err="1" smtClean="0"/>
+              <a:t>struct</a:t>
+            </a:r>
+            <a:r>
+              <a:rPr lang="en-US" dirty="0" smtClean="0"/>
+              <a:t> </a:t>
+            </a:r>
+            <a:r>
+              <a:rPr lang="en-US" dirty="0" err="1" smtClean="0"/>
+              <a:t>sockaddr_in</a:t>
+            </a:r>
+            <a:r>
+              <a:rPr lang="en-US" dirty="0" smtClean="0"/>
+              <a:t> local;</a:t>
+            </a:r>
           </a:p>
           <a:p>
             <a:r>
@@ -6209,26 +6058,21 @@
               <a:t>	</a:t>
             </a:r>
             <a:r>
+              <a:rPr lang="en-US" dirty="0" err="1" smtClean="0"/>
+              <a:t>memset((char</a:t>
+            </a:r>
+            <a:r>
               <a:rPr lang="en-US" dirty="0" smtClean="0"/>
-              <a:t>/</a:t>
+              <a:t> *) &amp;local, 0, </a:t>
+            </a:r>
+            <a:r>
+              <a:rPr lang="en-US" dirty="0" err="1" smtClean="0"/>
+              <a:t>sizeof(local</a:t>
             </a:r>
             <a:r>
               <a:rPr lang="en-US" dirty="0" smtClean="0"/>
-              <a:t>/ setup </a:t>
-            </a:r>
-            <a:r>
-              <a:rPr lang="en-US" dirty="0" err="1" smtClean="0"/>
-              <a:t>sockadr_in</a:t>
-            </a:r>
-            <a:r>
-              <a:rPr lang="en-US" dirty="0" smtClean="0"/>
-              <a:t> </a:t>
-            </a:r>
-            <a:r>
-              <a:rPr lang="en-US" dirty="0" err="1" smtClean="0"/>
-              <a:t>struct</a:t>
-            </a:r>
-            <a:endParaRPr lang="en-US" dirty="0" smtClean="0"/>
+              <a:t>));</a:t>
+            </a:r>
           </a:p>
           <a:p>
             <a:r>
@@ -6237,23 +6081,11 @@
             </a:r>
             <a:r>
               <a:rPr lang="en-US" dirty="0" err="1" smtClean="0"/>
-              <a:t>struct</a:t>
+              <a:t>local.sin_family</a:t>
             </a:r>
             <a:r>
               <a:rPr lang="en-US" dirty="0" smtClean="0"/>
-              <a:t> </a:t>
-            </a:r>
-            <a:r>
-              <a:rPr lang="en-US" dirty="0" err="1" smtClean="0"/>
-              <a:t>sockaddr_in</a:t>
-            </a:r>
-            <a:r>
-              <a:rPr lang="en-US" dirty="0" smtClean="0"/>
-              <a:t> local</a:t>
-            </a:r>
-            <a:r>
-              <a:rPr lang="en-US" dirty="0" smtClean="0"/>
-              <a:t>;</a:t>
+              <a:t> = AF_INET;</a:t>
             </a:r>
           </a:p>
           <a:p>
@@ -6263,15 +6095,58 @@
             </a:r>
             <a:r>
               <a:rPr lang="en-US" dirty="0" err="1" smtClean="0"/>
-              <a:t>memset</a:t>
+              <a:t>local.sin_port</a:t>
+            </a:r>
+            <a:r>
+              <a:rPr lang="en-US" dirty="0" smtClean="0"/>
+              <a:t> = </a:t>
             </a:r>
             <a:r>
               <a:rPr lang="en-US" dirty="0" err="1" smtClean="0"/>
-              <a:t>((char</a:t>
+              <a:t>htons(PORT</a:t>
             </a:r>
             <a:r>
               <a:rPr lang="en-US" dirty="0" smtClean="0"/>
-              <a:t> *) &amp;local, 0, </a:t>
+              <a:t>);</a:t>
+            </a:r>
+          </a:p>
+          <a:p>
+            <a:r>
+              <a:rPr lang="en-US" dirty="0" smtClean="0"/>
+              <a:t>       </a:t>
+            </a:r>
+            <a:r>
+              <a:rPr lang="en-US" dirty="0" err="1" smtClean="0"/>
+              <a:t>local.sin_addr.s_addr</a:t>
+            </a:r>
+            <a:r>
+              <a:rPr lang="en-US" dirty="0" smtClean="0"/>
+              <a:t> = AI_PASSIVE;</a:t>
+            </a:r>
+          </a:p>
+          <a:p>
+            <a:endParaRPr lang="en-US" dirty="0" smtClean="0"/>
+          </a:p>
+          <a:p>
+            <a:r>
+              <a:rPr lang="en-US" dirty="0" smtClean="0"/>
+              <a:t>	</a:t>
+            </a:r>
+            <a:r>
+              <a:rPr lang="en-US" dirty="0" err="1" smtClean="0"/>
+              <a:t>conn</a:t>
+            </a:r>
+            <a:r>
+              <a:rPr lang="en-US" dirty="0" smtClean="0"/>
+              <a:t>-&gt;</a:t>
+            </a:r>
+            <a:r>
+              <a:rPr lang="en-US" dirty="0" err="1" smtClean="0"/>
+              <a:t>bind_p(&amp;local</a:t>
+            </a:r>
+            <a:r>
+              <a:rPr lang="en-US" dirty="0" smtClean="0"/>
+              <a:t>, </a:t>
             </a:r>
             <a:r>
               <a:rPr lang="en-US" dirty="0" err="1" smtClean="0"/>
@@ -6279,94 +6154,13 @@
             </a:r>
             <a:r>
               <a:rPr lang="en-US" dirty="0" smtClean="0"/>
-              <a:t>))</a:t>
-            </a:r>
+              <a:t>));</a:t>
+            </a:r>
+          </a:p>
+          <a:p>
             <a:r>
               <a:rPr lang="en-US" dirty="0" smtClean="0"/>
-              <a:t>;</a:t>
-            </a:r>
-          </a:p>
-          <a:p>
-            <a:r>
-              <a:rPr lang="en-US" dirty="0" smtClean="0"/>
-              <a:t>	</a:t>
-            </a:r>
-            <a:r>
-              <a:rPr lang="en-US" dirty="0" err="1" smtClean="0"/>
-              <a:t>local.sin_family</a:t>
-            </a:r>
-            <a:r>
-              <a:rPr lang="en-US" dirty="0" smtClean="0"/>
-              <a:t> </a:t>
-            </a:r>
-            <a:r>
-              <a:rPr lang="en-US" dirty="0" smtClean="0"/>
-              <a:t>= AF_INET</a:t>
-            </a:r>
-            <a:r>
-              <a:rPr lang="en-US" dirty="0" smtClean="0"/>
-              <a:t>;</a:t>
-            </a:r>
-          </a:p>
-          <a:p>
-            <a:r>
-              <a:rPr lang="en-US" dirty="0" smtClean="0"/>
-              <a:t>	</a:t>
-            </a:r>
-            <a:r>
-              <a:rPr lang="en-US" dirty="0" err="1" smtClean="0"/>
-              <a:t>local.sin_port</a:t>
-            </a:r>
-            <a:r>
-              <a:rPr lang="en-US" dirty="0" smtClean="0"/>
-              <a:t> </a:t>
-            </a:r>
-            <a:r>
-              <a:rPr lang="en-US" dirty="0" smtClean="0"/>
-              <a:t>= </a:t>
-            </a:r>
-            <a:r>
-              <a:rPr lang="en-US" dirty="0" err="1" smtClean="0"/>
-              <a:t>htons(PORT</a:t>
-            </a:r>
-            <a:r>
-              <a:rPr lang="en-US" dirty="0" smtClean="0"/>
-              <a:t>)</a:t>
-            </a:r>
-            <a:r>
-              <a:rPr lang="en-US" dirty="0" smtClean="0"/>
-              <a:t>;</a:t>
-            </a:r>
-          </a:p>
-          <a:p>
-            <a:r>
-              <a:rPr lang="en-US" dirty="0" smtClean="0"/>
-              <a:t>       </a:t>
-            </a:r>
-            <a:r>
-              <a:rPr lang="en-US" dirty="0" err="1" smtClean="0"/>
-              <a:t>local.sin_addr.s_addr</a:t>
-            </a:r>
-            <a:r>
-              <a:rPr lang="en-US" dirty="0" smtClean="0"/>
-              <a:t> </a:t>
-            </a:r>
-            <a:r>
-              <a:rPr lang="en-US" dirty="0" smtClean="0"/>
-              <a:t>= AI_PASSIVE</a:t>
-            </a:r>
-            <a:r>
-              <a:rPr lang="en-US" dirty="0" smtClean="0"/>
-              <a:t>;</a:t>
-            </a:r>
-          </a:p>
-          <a:p>
-            <a:endParaRPr lang="en-US" dirty="0" smtClean="0"/>
-          </a:p>
-          <a:p>
-            <a:r>
-              <a:rPr lang="en-US" dirty="0" smtClean="0"/>
-              <a:t>	</a:t>
+              <a:t>	open = </a:t>
             </a:r>
             <a:r>
               <a:rPr lang="en-US" dirty="0" err="1" smtClean="0"/>
@@ -6378,49 +6172,11 @@
             </a:r>
             <a:r>
               <a:rPr lang="en-US" dirty="0" err="1" smtClean="0"/>
-              <a:t>bind_p(&amp;local</a:t>
+              <a:t>accept_p</a:t>
             </a:r>
             <a:r>
               <a:rPr lang="en-US" dirty="0" smtClean="0"/>
-              <a:t>, </a:t>
-            </a:r>
-            <a:r>
-              <a:rPr lang="en-US" dirty="0" err="1" smtClean="0"/>
-              <a:t>sizeof(local</a:t>
-            </a:r>
-            <a:r>
-              <a:rPr lang="en-US" dirty="0" smtClean="0"/>
-              <a:t>));</a:t>
-            </a:r>
-          </a:p>
-          <a:p>
-            <a:r>
-              <a:rPr lang="en-US" dirty="0" smtClean="0"/>
-              <a:t>	open </a:t>
-            </a:r>
-            <a:r>
-              <a:rPr lang="en-US" dirty="0" smtClean="0"/>
-              <a:t>= </a:t>
-            </a:r>
-            <a:r>
-              <a:rPr lang="en-US" dirty="0" err="1" smtClean="0"/>
-              <a:t>conn</a:t>
-            </a:r>
-            <a:r>
-              <a:rPr lang="en-US" dirty="0" smtClean="0"/>
-              <a:t>-&gt;</a:t>
-            </a:r>
-            <a:r>
-              <a:rPr lang="en-US" dirty="0" err="1" smtClean="0"/>
-              <a:t>accept_p</a:t>
-            </a:r>
-            <a:r>
-              <a:rPr lang="en-US" dirty="0" smtClean="0"/>
-              <a:t>()</a:t>
-            </a:r>
-            <a:r>
-              <a:rPr lang="en-US" dirty="0" smtClean="0"/>
-              <a:t>;</a:t>
+              <a:t>();</a:t>
             </a:r>
           </a:p>
           <a:p>

</xml_diff>

<commit_message>
added class relationship diagram to power point
</commit_message>
<xml_diff>
--- a/Presentation.pptx
+++ b/Presentation.pptx
@@ -5883,7 +5883,7 @@
           <a:p>
             <a:r>
               <a:rPr lang="en-US" dirty="0" smtClean="0"/>
-              <a:t>Example server program</a:t>
+              <a:t>Class Relationship</a:t>
             </a:r>
             <a:endParaRPr lang="en-US" dirty="0"/>
           </a:p>
@@ -5897,8 +5897,8 @@
         </p:nvSpPr>
         <p:spPr>
           <a:xfrm>
-            <a:off x="779463" y="1425388"/>
-            <a:ext cx="7145337" cy="5078314"/>
+            <a:off x="152400" y="2441050"/>
+            <a:ext cx="9220200" cy="2031325"/>
           </a:xfrm>
           <a:prstGeom prst="rect">
             <a:avLst/>
@@ -5912,288 +5912,291 @@
           <a:lstStyle/>
           <a:p>
             <a:r>
-              <a:rPr lang="en-US" dirty="0" err="1" smtClean="0"/>
-              <a:t>int</a:t>
-            </a:r>
-            <a:r>
-              <a:rPr lang="en-US" dirty="0" smtClean="0"/>
+              <a:rPr lang="en-US" sz="1050" dirty="0" smtClean="0">
+                <a:latin typeface="Monaco"/>
+                <a:cs typeface="Monaco"/>
+              </a:rPr>
+              <a:t> 			+</a:t>
+            </a:r>
+            <a:r>
+              <a:rPr lang="en-US" sz="1050" dirty="0" smtClean="0">
+                <a:latin typeface="Monaco"/>
+                <a:cs typeface="Monaco"/>
+              </a:rPr>
+              <a:t>-+-+-+-+-+-+-+-+           +-+-+-+-+-+-+-+-+-+</a:t>
+            </a:r>
+          </a:p>
+          <a:p>
+            <a:r>
+              <a:rPr lang="en-US" sz="1050" dirty="0" smtClean="0">
+                <a:latin typeface="Monaco"/>
+                <a:cs typeface="Monaco"/>
+              </a:rPr>
+              <a:t>                </a:t>
+            </a:r>
+            <a:r>
+              <a:rPr lang="en-US" sz="1050" dirty="0" smtClean="0">
+                <a:latin typeface="Monaco"/>
+                <a:cs typeface="Monaco"/>
+              </a:rPr>
+              <a:t> |     </a:t>
+            </a:r>
+            <a:r>
+              <a:rPr lang="en-US" sz="1050" dirty="0" err="1" smtClean="0">
+                <a:latin typeface="Monaco"/>
+                <a:cs typeface="Monaco"/>
+              </a:rPr>
+              <a:t>UDPPlus</a:t>
+            </a:r>
+            <a:r>
+              <a:rPr lang="en-US" sz="1050" dirty="0" smtClean="0">
+                <a:latin typeface="Monaco"/>
+                <a:cs typeface="Monaco"/>
+              </a:rPr>
+              <a:t>   | -&gt; spawns | listener thread |</a:t>
+            </a:r>
+          </a:p>
+          <a:p>
+            <a:r>
+              <a:rPr lang="en-US" sz="1050" dirty="0" smtClean="0">
+                <a:latin typeface="Monaco"/>
+                <a:cs typeface="Monaco"/>
+              </a:rPr>
+              <a:t>                </a:t>
+            </a:r>
+            <a:r>
+              <a:rPr lang="en-US" sz="1050" dirty="0" smtClean="0">
+                <a:latin typeface="Monaco"/>
+                <a:cs typeface="Monaco"/>
+              </a:rPr>
+              <a:t> +</a:t>
+            </a:r>
+            <a:r>
+              <a:rPr lang="en-US" sz="1050" dirty="0" smtClean="0">
+                <a:latin typeface="Monaco"/>
+                <a:cs typeface="Monaco"/>
+              </a:rPr>
+              <a:t>-+-+-+-+-+-+-+-+           +-+-+-+-+-+-+-+-+-+ </a:t>
+            </a:r>
+          </a:p>
+          <a:p>
+            <a:r>
+              <a:rPr lang="en-US" sz="1050" dirty="0" smtClean="0">
+                <a:latin typeface="Monaco"/>
+                <a:cs typeface="Monaco"/>
+              </a:rPr>
+              <a:t>                    </a:t>
+            </a:r>
+            <a:r>
+              <a:rPr lang="en-US" sz="1050" dirty="0" smtClean="0">
+                <a:latin typeface="Monaco"/>
+                <a:cs typeface="Monaco"/>
+              </a:rPr>
+              <a:t>        </a:t>
+            </a:r>
+            <a:r>
+              <a:rPr lang="en-US" sz="1050" dirty="0" smtClean="0">
+                <a:latin typeface="Monaco"/>
+                <a:cs typeface="Monaco"/>
+              </a:rPr>
+              <a:t>|</a:t>
+            </a:r>
+          </a:p>
+          <a:p>
+            <a:r>
+              <a:rPr lang="en-US" sz="1050" dirty="0" smtClean="0">
+                <a:latin typeface="Monaco"/>
+                <a:cs typeface="Monaco"/>
+              </a:rPr>
+              <a:t>                    </a:t>
+            </a:r>
+            <a:r>
+              <a:rPr lang="en-US" sz="1050" dirty="0" smtClean="0">
+                <a:latin typeface="Monaco"/>
+                <a:cs typeface="Monaco"/>
+              </a:rPr>
+              <a:t>        </a:t>
+            </a:r>
+            <a:r>
+              <a:rPr lang="en-US" sz="1050" dirty="0" smtClean="0">
+                <a:latin typeface="Monaco"/>
+                <a:cs typeface="Monaco"/>
+              </a:rPr>
+              <a:t>| has many </a:t>
+            </a:r>
+            <a:r>
+              <a:rPr lang="en-US" sz="1050" dirty="0" err="1" smtClean="0">
+                <a:latin typeface="Monaco"/>
+                <a:cs typeface="Monaco"/>
+              </a:rPr>
+              <a:t>UDPPlusConnections</a:t>
+            </a:r>
+            <a:endParaRPr lang="en-US" sz="1050" dirty="0" smtClean="0">
+              <a:latin typeface="Monaco"/>
+              <a:cs typeface="Monaco"/>
+            </a:endParaRPr>
+          </a:p>
+          <a:p>
+            <a:r>
+              <a:rPr lang="en-US" sz="1050" dirty="0" smtClean="0">
+                <a:latin typeface="Monaco"/>
+                <a:cs typeface="Monaco"/>
+              </a:rPr>
+              <a:t>                    </a:t>
+            </a:r>
+            <a:r>
+              <a:rPr lang="en-US" sz="1050" dirty="0" smtClean="0">
+                <a:latin typeface="Monaco"/>
+                <a:cs typeface="Monaco"/>
+              </a:rPr>
+              <a:t>        </a:t>
+            </a:r>
+            <a:r>
+              <a:rPr lang="en-US" sz="1050" dirty="0" smtClean="0">
+                <a:latin typeface="Monaco"/>
+                <a:cs typeface="Monaco"/>
+              </a:rPr>
+              <a:t>|</a:t>
+            </a:r>
+          </a:p>
+          <a:p>
+            <a:r>
+              <a:rPr lang="en-US" sz="1050" dirty="0" smtClean="0">
+                <a:latin typeface="Monaco"/>
+                <a:cs typeface="Monaco"/>
+              </a:rPr>
+              <a:t>           -------------------------------------------------------</a:t>
+            </a:r>
+            <a:r>
+              <a:rPr lang="en-US" sz="1050" dirty="0" smtClean="0">
+                <a:latin typeface="Monaco"/>
+                <a:cs typeface="Monaco"/>
+              </a:rPr>
+              <a:t>--</a:t>
+            </a:r>
+          </a:p>
+          <a:p>
+            <a:r>
+              <a:rPr lang="en-US" sz="1050" dirty="0" smtClean="0">
+                <a:latin typeface="Monaco"/>
+                <a:cs typeface="Monaco"/>
+              </a:rPr>
+              <a:t>           |                                                      </a:t>
+            </a:r>
+            <a:r>
+              <a:rPr lang="en-US" sz="1050" dirty="0" smtClean="0">
+                <a:latin typeface="Monaco"/>
+                <a:cs typeface="Monaco"/>
+              </a:rPr>
+              <a:t> |</a:t>
+            </a:r>
+            <a:endParaRPr lang="en-US" sz="1050" dirty="0" smtClean="0">
+              <a:latin typeface="Monaco"/>
+              <a:cs typeface="Monaco"/>
+            </a:endParaRPr>
+          </a:p>
+          <a:p>
+            <a:r>
+              <a:rPr lang="en-US" sz="1050" dirty="0" smtClean="0">
+                <a:latin typeface="Monaco"/>
+                <a:cs typeface="Monaco"/>
+              </a:rPr>
+              <a:t>    +-+-+-+-+-+-+-+-+-+-+           +-+-+-+-+-+-+-+-     </a:t>
+            </a:r>
+            <a:r>
+              <a:rPr lang="en-US" sz="1050" dirty="0" smtClean="0">
+                <a:latin typeface="Monaco"/>
+                <a:cs typeface="Monaco"/>
+              </a:rPr>
+              <a:t> +</a:t>
+            </a:r>
+            <a:r>
+              <a:rPr lang="en-US" sz="1050" dirty="0" smtClean="0">
+                <a:latin typeface="Monaco"/>
+                <a:cs typeface="Monaco"/>
+              </a:rPr>
+              <a:t>-+-+-+-+-+-+-+-+-+-+           +-+-+-+-+-+-+-+-</a:t>
+            </a:r>
+          </a:p>
+          <a:p>
+            <a:r>
+              <a:rPr lang="en-US" sz="1050" dirty="0" smtClean="0">
+                <a:latin typeface="Monaco"/>
+                <a:cs typeface="Monaco"/>
+              </a:rPr>
+              <a:t>    | </a:t>
+            </a:r>
+            <a:r>
+              <a:rPr lang="en-US" sz="1050" dirty="0" err="1" smtClean="0">
+                <a:latin typeface="Monaco"/>
+                <a:cs typeface="Monaco"/>
+              </a:rPr>
+              <a:t>UDPPlusConnection</a:t>
+            </a:r>
+            <a:r>
+              <a:rPr lang="en-US" sz="1050" dirty="0" smtClean="0">
+                <a:latin typeface="Monaco"/>
+                <a:cs typeface="Monaco"/>
+              </a:rPr>
+              <a:t> | -&gt; spawns | timer thread |     </a:t>
+            </a:r>
+            <a:r>
+              <a:rPr lang="en-US" sz="1050" dirty="0" smtClean="0">
+                <a:latin typeface="Monaco"/>
+                <a:cs typeface="Monaco"/>
+              </a:rPr>
+              <a:t> | </a:t>
+            </a:r>
+            <a:r>
+              <a:rPr lang="en-US" sz="1050" dirty="0" err="1" smtClean="0">
+                <a:latin typeface="Monaco"/>
+                <a:cs typeface="Monaco"/>
+              </a:rPr>
+              <a:t>UDPPlusConnection</a:t>
+            </a:r>
+            <a:r>
+              <a:rPr lang="en-US" sz="1050" dirty="0" smtClean="0">
+                <a:latin typeface="Monaco"/>
+                <a:cs typeface="Monaco"/>
+              </a:rPr>
+              <a:t> | -&gt; spawns | timer thread |</a:t>
+            </a:r>
+          </a:p>
+          <a:p>
+            <a:r>
+              <a:rPr lang="en-US" sz="1050" dirty="0" smtClean="0">
+                <a:latin typeface="Monaco"/>
+                <a:cs typeface="Monaco"/>
+              </a:rPr>
+              <a:t>    +-+-+-+-+-+-+-+-+-+-+           +-+-+-+-+-+-+-+-     </a:t>
+            </a:r>
+            <a:r>
+              <a:rPr lang="en-US" sz="1050" dirty="0" smtClean="0">
+                <a:latin typeface="Monaco"/>
+                <a:cs typeface="Monaco"/>
+              </a:rPr>
+              <a:t> +</a:t>
+            </a:r>
+            <a:r>
+              <a:rPr lang="en-US" sz="1050" dirty="0" smtClean="0">
+                <a:latin typeface="Monaco"/>
+                <a:cs typeface="Monaco"/>
+              </a:rPr>
+              <a:t>-+-+-+-+-+-+-+-+-+-+           +-+-+-+-+-+-+-+-</a:t>
+            </a:r>
+          </a:p>
+          <a:p>
+            <a:r>
+              <a:rPr lang="en-US" sz="1050" dirty="0" smtClean="0">
+                <a:latin typeface="Monaco"/>
+                <a:cs typeface="Monaco"/>
+              </a:rPr>
               <a:t> </a:t>
             </a:r>
-            <a:r>
-              <a:rPr lang="en-US" dirty="0" err="1" smtClean="0"/>
-              <a:t>main(int</a:t>
-            </a:r>
-            <a:r>
-              <a:rPr lang="en-US" dirty="0" smtClean="0"/>
-              <a:t> </a:t>
-            </a:r>
-            <a:r>
-              <a:rPr lang="en-US" dirty="0" err="1" smtClean="0"/>
-              <a:t>argc</a:t>
-            </a:r>
-            <a:r>
-              <a:rPr lang="en-US" dirty="0" smtClean="0"/>
-              <a:t>, char* </a:t>
-            </a:r>
-            <a:r>
-              <a:rPr lang="en-US" dirty="0" err="1" smtClean="0"/>
-              <a:t>argv</a:t>
-            </a:r>
-            <a:r>
-              <a:rPr lang="en-US" dirty="0" smtClean="0"/>
-              <a:t>[]) {</a:t>
-            </a:r>
-          </a:p>
-          <a:p>
-            <a:endParaRPr lang="en-US" dirty="0" smtClean="0"/>
-          </a:p>
-          <a:p>
-            <a:r>
-              <a:rPr lang="en-US" dirty="0" smtClean="0"/>
-              <a:t>	</a:t>
-            </a:r>
-            <a:r>
-              <a:rPr lang="en-US" dirty="0" err="1" smtClean="0"/>
-              <a:t>UDPPlus</a:t>
-            </a:r>
-            <a:r>
-              <a:rPr lang="en-US" dirty="0" smtClean="0"/>
-              <a:t> *</a:t>
-            </a:r>
-            <a:r>
-              <a:rPr lang="en-US" dirty="0" err="1" smtClean="0"/>
-              <a:t>conn</a:t>
-            </a:r>
-            <a:r>
-              <a:rPr lang="en-US" dirty="0" smtClean="0"/>
-              <a:t> = new </a:t>
-            </a:r>
-            <a:r>
-              <a:rPr lang="en-US" dirty="0" err="1" smtClean="0"/>
-              <a:t>UDPPlus</a:t>
-            </a:r>
-            <a:r>
-              <a:rPr lang="en-US" dirty="0" smtClean="0"/>
-              <a:t>;</a:t>
-            </a:r>
-          </a:p>
-          <a:p>
-            <a:r>
-              <a:rPr lang="en-US" dirty="0" smtClean="0"/>
-              <a:t>	</a:t>
-            </a:r>
-            <a:r>
-              <a:rPr lang="en-US" dirty="0" err="1" smtClean="0"/>
-              <a:t>UDPPlusConnection</a:t>
-            </a:r>
-            <a:r>
-              <a:rPr lang="en-US" dirty="0" smtClean="0"/>
-              <a:t> *open;</a:t>
-            </a:r>
-          </a:p>
-          <a:p>
-            <a:r>
-              <a:rPr lang="en-US" dirty="0" smtClean="0"/>
-              <a:t>	const </a:t>
-            </a:r>
-            <a:r>
-              <a:rPr lang="en-US" dirty="0" err="1" smtClean="0"/>
-              <a:t>int</a:t>
-            </a:r>
-            <a:r>
-              <a:rPr lang="en-US" dirty="0" smtClean="0"/>
-              <a:t> PORT = 30000; </a:t>
-            </a:r>
-          </a:p>
-          <a:p>
-            <a:r>
-              <a:rPr lang="en-US" dirty="0" smtClean="0"/>
-              <a:t>	</a:t>
-            </a:r>
-          </a:p>
-          <a:p>
-            <a:r>
-              <a:rPr lang="en-US" dirty="0" smtClean="0"/>
-              <a:t>	// setup </a:t>
-            </a:r>
-            <a:r>
-              <a:rPr lang="en-US" dirty="0" err="1" smtClean="0"/>
-              <a:t>sockadr_in</a:t>
-            </a:r>
-            <a:r>
-              <a:rPr lang="en-US" dirty="0" smtClean="0"/>
-              <a:t> </a:t>
-            </a:r>
-            <a:r>
-              <a:rPr lang="en-US" dirty="0" err="1" smtClean="0"/>
-              <a:t>struct</a:t>
-            </a:r>
-            <a:endParaRPr lang="en-US" dirty="0" smtClean="0"/>
-          </a:p>
-          <a:p>
-            <a:r>
-              <a:rPr lang="en-US" dirty="0" smtClean="0"/>
-              <a:t>	</a:t>
-            </a:r>
-            <a:r>
-              <a:rPr lang="en-US" dirty="0" err="1" smtClean="0"/>
-              <a:t>struct</a:t>
-            </a:r>
-            <a:r>
-              <a:rPr lang="en-US" dirty="0" smtClean="0"/>
-              <a:t> </a:t>
-            </a:r>
-            <a:r>
-              <a:rPr lang="en-US" dirty="0" err="1" smtClean="0"/>
-              <a:t>sockaddr_in</a:t>
-            </a:r>
-            <a:r>
-              <a:rPr lang="en-US" dirty="0" smtClean="0"/>
-              <a:t> local;</a:t>
-            </a:r>
-          </a:p>
-          <a:p>
-            <a:r>
-              <a:rPr lang="en-US" dirty="0" smtClean="0"/>
-              <a:t>	</a:t>
-            </a:r>
-            <a:r>
-              <a:rPr lang="en-US" dirty="0" err="1" smtClean="0"/>
-              <a:t>memset((char</a:t>
-            </a:r>
-            <a:r>
-              <a:rPr lang="en-US" dirty="0" smtClean="0"/>
-              <a:t> *) &amp;local, 0, </a:t>
-            </a:r>
-            <a:r>
-              <a:rPr lang="en-US" dirty="0" err="1" smtClean="0"/>
-              <a:t>sizeof(local</a:t>
-            </a:r>
-            <a:r>
-              <a:rPr lang="en-US" dirty="0" smtClean="0"/>
-              <a:t>));</a:t>
-            </a:r>
-          </a:p>
-          <a:p>
-            <a:r>
-              <a:rPr lang="en-US" dirty="0" smtClean="0"/>
-              <a:t>	</a:t>
-            </a:r>
-            <a:r>
-              <a:rPr lang="en-US" dirty="0" err="1" smtClean="0"/>
-              <a:t>local.sin_family</a:t>
-            </a:r>
-            <a:r>
-              <a:rPr lang="en-US" dirty="0" smtClean="0"/>
-              <a:t> = AF_INET;</a:t>
-            </a:r>
-          </a:p>
-          <a:p>
-            <a:r>
-              <a:rPr lang="en-US" dirty="0" smtClean="0"/>
-              <a:t>	</a:t>
-            </a:r>
-            <a:r>
-              <a:rPr lang="en-US" dirty="0" err="1" smtClean="0"/>
-              <a:t>local.sin_port</a:t>
-            </a:r>
-            <a:r>
-              <a:rPr lang="en-US" dirty="0" smtClean="0"/>
-              <a:t> = </a:t>
-            </a:r>
-            <a:r>
-              <a:rPr lang="en-US" dirty="0" err="1" smtClean="0"/>
-              <a:t>htons(PORT</a:t>
-            </a:r>
-            <a:r>
-              <a:rPr lang="en-US" dirty="0" smtClean="0"/>
-              <a:t>);</a:t>
-            </a:r>
-          </a:p>
-          <a:p>
-            <a:r>
-              <a:rPr lang="en-US" dirty="0" smtClean="0"/>
-              <a:t>       </a:t>
-            </a:r>
-            <a:r>
-              <a:rPr lang="en-US" dirty="0" err="1" smtClean="0"/>
-              <a:t>local.sin_addr.s_addr</a:t>
-            </a:r>
-            <a:r>
-              <a:rPr lang="en-US" dirty="0" smtClean="0"/>
-              <a:t> = AI_PASSIVE;</a:t>
-            </a:r>
-          </a:p>
-          <a:p>
-            <a:endParaRPr lang="en-US" dirty="0" smtClean="0"/>
-          </a:p>
-          <a:p>
-            <a:r>
-              <a:rPr lang="en-US" dirty="0" smtClean="0"/>
-              <a:t>	</a:t>
-            </a:r>
-            <a:r>
-              <a:rPr lang="en-US" dirty="0" err="1" smtClean="0"/>
-              <a:t>conn</a:t>
-            </a:r>
-            <a:r>
-              <a:rPr lang="en-US" dirty="0" smtClean="0"/>
-              <a:t>-&gt;</a:t>
-            </a:r>
-            <a:r>
-              <a:rPr lang="en-US" dirty="0" err="1" smtClean="0"/>
-              <a:t>bind_p(&amp;local</a:t>
-            </a:r>
-            <a:r>
-              <a:rPr lang="en-US" dirty="0" smtClean="0"/>
-              <a:t>, </a:t>
-            </a:r>
-            <a:r>
-              <a:rPr lang="en-US" dirty="0" err="1" smtClean="0"/>
-              <a:t>sizeof(local</a:t>
-            </a:r>
-            <a:r>
-              <a:rPr lang="en-US" dirty="0" smtClean="0"/>
-              <a:t>));</a:t>
-            </a:r>
-          </a:p>
-          <a:p>
-            <a:r>
-              <a:rPr lang="en-US" dirty="0" smtClean="0"/>
-              <a:t>	open = </a:t>
-            </a:r>
-            <a:r>
-              <a:rPr lang="en-US" dirty="0" err="1" smtClean="0"/>
-              <a:t>conn</a:t>
-            </a:r>
-            <a:r>
-              <a:rPr lang="en-US" dirty="0" smtClean="0"/>
-              <a:t>-&gt;</a:t>
-            </a:r>
-            <a:r>
-              <a:rPr lang="en-US" dirty="0" err="1" smtClean="0"/>
-              <a:t>accept_p</a:t>
-            </a:r>
-            <a:r>
-              <a:rPr lang="en-US" dirty="0" smtClean="0"/>
-              <a:t>();</a:t>
-            </a:r>
-          </a:p>
-          <a:p>
-            <a:endParaRPr lang="en-US" dirty="0" smtClean="0"/>
-          </a:p>
-          <a:p>
-            <a:r>
-              <a:rPr lang="en-US" dirty="0" smtClean="0"/>
-              <a:t>	return 0;</a:t>
-            </a:r>
-          </a:p>
-          <a:p>
-            <a:r>
-              <a:rPr lang="en-US" dirty="0" smtClean="0"/>
-              <a:t>}</a:t>
-            </a:r>
-            <a:endParaRPr lang="en-US" dirty="0"/>
+            <a:endParaRPr lang="en-US" sz="1050" dirty="0">
+              <a:latin typeface="Monaco"/>
+              <a:cs typeface="Monaco"/>
+            </a:endParaRPr>
           </a:p>
         </p:txBody>
       </p:sp>

</xml_diff>

<commit_message>
added git image to slideshow, take a look if you can asad don't know where it really fits
</commit_message>
<xml_diff>
--- a/Presentation.pptx
+++ b/Presentation.pptx
@@ -9,6 +9,7 @@
     <p:sldId id="257" r:id="rId3"/>
     <p:sldId id="258" r:id="rId4"/>
     <p:sldId id="259" r:id="rId5"/>
+    <p:sldId id="260" r:id="rId6"/>
   </p:sldIdLst>
   <p:sldSz cx="9144000" cy="6858000" type="screen4x3"/>
   <p:notesSz cx="6858000" cy="9144000"/>
@@ -5916,30 +5917,16 @@
                 <a:latin typeface="Monaco"/>
                 <a:cs typeface="Monaco"/>
               </a:rPr>
-              <a:t> 			+</a:t>
-            </a:r>
+              <a:t> 			+-+-+-+-+-+-+-+-+           +-+-+-+-+-+-+-+-+-+</a:t>
+            </a:r>
+          </a:p>
+          <a:p>
             <a:r>
               <a:rPr lang="en-US" sz="1050" dirty="0" smtClean="0">
                 <a:latin typeface="Monaco"/>
                 <a:cs typeface="Monaco"/>
               </a:rPr>
-              <a:t>-+-+-+-+-+-+-+-+           +-+-+-+-+-+-+-+-+-+</a:t>
-            </a:r>
-          </a:p>
-          <a:p>
-            <a:r>
-              <a:rPr lang="en-US" sz="1050" dirty="0" smtClean="0">
-                <a:latin typeface="Monaco"/>
-                <a:cs typeface="Monaco"/>
-              </a:rPr>
-              <a:t>                </a:t>
-            </a:r>
-            <a:r>
-              <a:rPr lang="en-US" sz="1050" dirty="0" smtClean="0">
-                <a:latin typeface="Monaco"/>
-                <a:cs typeface="Monaco"/>
-              </a:rPr>
-              <a:t> |     </a:t>
+              <a:t>                 |     </a:t>
             </a:r>
             <a:r>
               <a:rPr lang="en-US" sz="1050" dirty="0" err="1" smtClean="0">
@@ -5962,67 +5949,25 @@
                 <a:latin typeface="Monaco"/>
                 <a:cs typeface="Monaco"/>
               </a:rPr>
-              <a:t>                </a:t>
-            </a:r>
+              <a:t>                 +-+-+-+-+-+-+-+-+           +-+-+-+-+-+-+-+-+-+ </a:t>
+            </a:r>
+          </a:p>
+          <a:p>
             <a:r>
               <a:rPr lang="en-US" sz="1050" dirty="0" smtClean="0">
                 <a:latin typeface="Monaco"/>
                 <a:cs typeface="Monaco"/>
               </a:rPr>
-              <a:t> +</a:t>
-            </a:r>
+              <a:t>                            |</a:t>
+            </a:r>
+          </a:p>
+          <a:p>
             <a:r>
               <a:rPr lang="en-US" sz="1050" dirty="0" smtClean="0">
                 <a:latin typeface="Monaco"/>
                 <a:cs typeface="Monaco"/>
               </a:rPr>
-              <a:t>-+-+-+-+-+-+-+-+           +-+-+-+-+-+-+-+-+-+ </a:t>
-            </a:r>
-          </a:p>
-          <a:p>
-            <a:r>
-              <a:rPr lang="en-US" sz="1050" dirty="0" smtClean="0">
-                <a:latin typeface="Monaco"/>
-                <a:cs typeface="Monaco"/>
-              </a:rPr>
-              <a:t>                    </a:t>
-            </a:r>
-            <a:r>
-              <a:rPr lang="en-US" sz="1050" dirty="0" smtClean="0">
-                <a:latin typeface="Monaco"/>
-                <a:cs typeface="Monaco"/>
-              </a:rPr>
-              <a:t>        </a:t>
-            </a:r>
-            <a:r>
-              <a:rPr lang="en-US" sz="1050" dirty="0" smtClean="0">
-                <a:latin typeface="Monaco"/>
-                <a:cs typeface="Monaco"/>
-              </a:rPr>
-              <a:t>|</a:t>
-            </a:r>
-          </a:p>
-          <a:p>
-            <a:r>
-              <a:rPr lang="en-US" sz="1050" dirty="0" smtClean="0">
-                <a:latin typeface="Monaco"/>
-                <a:cs typeface="Monaco"/>
-              </a:rPr>
-              <a:t>                    </a:t>
-            </a:r>
-            <a:r>
-              <a:rPr lang="en-US" sz="1050" dirty="0" smtClean="0">
-                <a:latin typeface="Monaco"/>
-                <a:cs typeface="Monaco"/>
-              </a:rPr>
-              <a:t>        </a:t>
-            </a:r>
-            <a:r>
-              <a:rPr lang="en-US" sz="1050" dirty="0" smtClean="0">
-                <a:latin typeface="Monaco"/>
-                <a:cs typeface="Monaco"/>
-              </a:rPr>
-              <a:t>| has many </a:t>
+              <a:t>                            | has many </a:t>
             </a:r>
             <a:r>
               <a:rPr lang="en-US" sz="1050" dirty="0" err="1" smtClean="0">
@@ -6042,21 +5987,25 @@
                 <a:latin typeface="Monaco"/>
                 <a:cs typeface="Monaco"/>
               </a:rPr>
-              <a:t>                    </a:t>
-            </a:r>
+              <a:t>                            |</a:t>
+            </a:r>
+          </a:p>
+          <a:p>
             <a:r>
               <a:rPr lang="en-US" sz="1050" dirty="0" smtClean="0">
                 <a:latin typeface="Monaco"/>
                 <a:cs typeface="Monaco"/>
               </a:rPr>
-              <a:t>        </a:t>
-            </a:r>
+              <a:t>           ---------------------------------------------------------</a:t>
+            </a:r>
+          </a:p>
+          <a:p>
             <a:r>
               <a:rPr lang="en-US" sz="1050" dirty="0" smtClean="0">
                 <a:latin typeface="Monaco"/>
                 <a:cs typeface="Monaco"/>
               </a:rPr>
-              <a:t>|</a:t>
+              <a:t>           |                                                       |</a:t>
             </a:r>
           </a:p>
           <a:p>
@@ -6065,57 +6014,7 @@
                 <a:latin typeface="Monaco"/>
                 <a:cs typeface="Monaco"/>
               </a:rPr>
-              <a:t>           -------------------------------------------------------</a:t>
-            </a:r>
-            <a:r>
-              <a:rPr lang="en-US" sz="1050" dirty="0" smtClean="0">
-                <a:latin typeface="Monaco"/>
-                <a:cs typeface="Monaco"/>
-              </a:rPr>
-              <a:t>--</a:t>
-            </a:r>
-          </a:p>
-          <a:p>
-            <a:r>
-              <a:rPr lang="en-US" sz="1050" dirty="0" smtClean="0">
-                <a:latin typeface="Monaco"/>
-                <a:cs typeface="Monaco"/>
-              </a:rPr>
-              <a:t>           |                                                      </a:t>
-            </a:r>
-            <a:r>
-              <a:rPr lang="en-US" sz="1050" dirty="0" smtClean="0">
-                <a:latin typeface="Monaco"/>
-                <a:cs typeface="Monaco"/>
-              </a:rPr>
-              <a:t> |</a:t>
-            </a:r>
-            <a:endParaRPr lang="en-US" sz="1050" dirty="0" smtClean="0">
-              <a:latin typeface="Monaco"/>
-              <a:cs typeface="Monaco"/>
-            </a:endParaRPr>
-          </a:p>
-          <a:p>
-            <a:r>
-              <a:rPr lang="en-US" sz="1050" dirty="0" smtClean="0">
-                <a:latin typeface="Monaco"/>
-                <a:cs typeface="Monaco"/>
-              </a:rPr>
-              <a:t>    +-+-+-+-+-+-+-+-+-+-+           +-+-+-+-+-+-+-+-     </a:t>
-            </a:r>
-            <a:r>
-              <a:rPr lang="en-US" sz="1050" dirty="0" smtClean="0">
-                <a:latin typeface="Monaco"/>
-                <a:cs typeface="Monaco"/>
-              </a:rPr>
-              <a:t> +</a:t>
-            </a:r>
-            <a:r>
-              <a:rPr lang="en-US" sz="1050" dirty="0" smtClean="0">
-                <a:latin typeface="Monaco"/>
-                <a:cs typeface="Monaco"/>
-              </a:rPr>
-              <a:t>-+-+-+-+-+-+-+-+-+-+           +-+-+-+-+-+-+-+-</a:t>
+              <a:t>    +-+-+-+-+-+-+-+-+-+-+           +-+-+-+-+-+-+-+-      +-+-+-+-+-+-+-+-+-+-+           +-+-+-+-+-+-+-+-</a:t>
             </a:r>
           </a:p>
           <a:p>
@@ -6138,14 +6037,7 @@
                 <a:latin typeface="Monaco"/>
                 <a:cs typeface="Monaco"/>
               </a:rPr>
-              <a:t> | -&gt; spawns | timer thread |     </a:t>
-            </a:r>
-            <a:r>
-              <a:rPr lang="en-US" sz="1050" dirty="0" smtClean="0">
-                <a:latin typeface="Monaco"/>
-                <a:cs typeface="Monaco"/>
-              </a:rPr>
-              <a:t> | </a:t>
+              <a:t> | -&gt; spawns | timer thread |      | </a:t>
             </a:r>
             <a:r>
               <a:rPr lang="en-US" sz="1050" dirty="0" err="1" smtClean="0">
@@ -6168,21 +6060,7 @@
                 <a:latin typeface="Monaco"/>
                 <a:cs typeface="Monaco"/>
               </a:rPr>
-              <a:t>    +-+-+-+-+-+-+-+-+-+-+           +-+-+-+-+-+-+-+-     </a:t>
-            </a:r>
-            <a:r>
-              <a:rPr lang="en-US" sz="1050" dirty="0" smtClean="0">
-                <a:latin typeface="Monaco"/>
-                <a:cs typeface="Monaco"/>
-              </a:rPr>
-              <a:t> +</a:t>
-            </a:r>
-            <a:r>
-              <a:rPr lang="en-US" sz="1050" dirty="0" smtClean="0">
-                <a:latin typeface="Monaco"/>
-                <a:cs typeface="Monaco"/>
-              </a:rPr>
-              <a:t>-+-+-+-+-+-+-+-+-+-+           +-+-+-+-+-+-+-+-</a:t>
+              <a:t>    +-+-+-+-+-+-+-+-+-+-+           +-+-+-+-+-+-+-+-      +-+-+-+-+-+-+-+-+-+-+           +-+-+-+-+-+-+-+-</a:t>
             </a:r>
           </a:p>
           <a:p>
@@ -6212,6 +6090,83 @@
       </p:par>
     </p:tnLst>
   </p:timing>
+</p:sld>
+</file>
+
+<file path=ppt/slides/slide5.xml><?xml version="1.0" encoding="utf-8"?>
+<p:sld xmlns:a="http://schemas.openxmlformats.org/drawingml/2006/main" xmlns:r="http://schemas.openxmlformats.org/officeDocument/2006/relationships" xmlns:mc="http://schemas.openxmlformats.org/markup-compatibility/2006" xmlns:mv="urn:schemas-microsoft-com:mac:vml" xmlns:p="http://schemas.openxmlformats.org/presentationml/2006/main" mc:Ignorable="mv" mc:PreserveAttributes="mv:*">
+  <p:cSld>
+    <p:spTree>
+      <p:nvGrpSpPr>
+        <p:cNvPr id="1" name=""/>
+        <p:cNvGrpSpPr/>
+        <p:nvPr/>
+      </p:nvGrpSpPr>
+      <p:grpSpPr>
+        <a:xfrm>
+          <a:off x="0" y="0"/>
+          <a:ext cx="0" cy="0"/>
+          <a:chOff x="0" y="0"/>
+          <a:chExt cx="0" cy="0"/>
+        </a:xfrm>
+      </p:grpSpPr>
+      <p:sp>
+        <p:nvSpPr>
+          <p:cNvPr id="2" name="Title 1"/>
+          <p:cNvSpPr>
+            <a:spLocks noGrp="1"/>
+          </p:cNvSpPr>
+          <p:nvPr>
+            <p:ph type="title"/>
+          </p:nvPr>
+        </p:nvSpPr>
+        <p:spPr>
+          <a:xfrm>
+            <a:off x="779463" y="0"/>
+            <a:ext cx="7583487" cy="1044388"/>
+          </a:xfrm>
+        </p:spPr>
+        <p:txBody>
+          <a:bodyPr/>
+          <a:lstStyle/>
+          <a:p>
+            <a:r>
+              <a:rPr lang="en-US" dirty="0" err="1" smtClean="0"/>
+              <a:t>Git</a:t>
+            </a:r>
+            <a:endParaRPr lang="en-US" dirty="0"/>
+          </a:p>
+        </p:txBody>
+      </p:sp>
+      <p:pic>
+        <p:nvPicPr>
+          <p:cNvPr id="4" name="Content Placeholder 3" descr="gittree.png"/>
+          <p:cNvPicPr>
+            <a:picLocks noGrp="1" noChangeAspect="1"/>
+          </p:cNvPicPr>
+          <p:nvPr>
+            <p:ph idx="1"/>
+          </p:nvPr>
+        </p:nvPicPr>
+        <p:blipFill>
+          <a:blip r:embed="rId2"/>
+          <a:srcRect l="-23601" r="-23601"/>
+          <a:stretch>
+            <a:fillRect/>
+          </a:stretch>
+        </p:blipFill>
+        <p:spPr>
+          <a:xfrm>
+            <a:off x="-466595" y="1219200"/>
+            <a:ext cx="9610595" cy="5334000"/>
+          </a:xfrm>
+        </p:spPr>
+      </p:pic>
+    </p:spTree>
+  </p:cSld>
+  <p:clrMapOvr>
+    <a:masterClrMapping/>
+  </p:clrMapOvr>
 </p:sld>
 </file>
 

</xml_diff>